<commit_message>
Aula prática 04 - correta
</commit_message>
<xml_diff>
--- a/Prática04_ISCE_Calvetti.pptx
+++ b/Prática04_ISCE_Calvetti.pptx
@@ -5,7 +5,7 @@
     <p:sldMasterId id="2147483648" r:id="rId1"/>
   </p:sldMasterIdLst>
   <p:notesMasterIdLst>
-    <p:notesMasterId r:id="rId21"/>
+    <p:notesMasterId r:id="rId22"/>
   </p:notesMasterIdLst>
   <p:sldIdLst>
     <p:sldId id="256" r:id="rId2"/>
@@ -21,12 +21,13 @@
     <p:sldId id="263" r:id="rId12"/>
     <p:sldId id="264" r:id="rId13"/>
     <p:sldId id="265" r:id="rId14"/>
-    <p:sldId id="266" r:id="rId15"/>
-    <p:sldId id="275" r:id="rId16"/>
-    <p:sldId id="276" r:id="rId17"/>
-    <p:sldId id="270" r:id="rId18"/>
-    <p:sldId id="271" r:id="rId19"/>
-    <p:sldId id="272" r:id="rId20"/>
+    <p:sldId id="280" r:id="rId15"/>
+    <p:sldId id="266" r:id="rId16"/>
+    <p:sldId id="275" r:id="rId17"/>
+    <p:sldId id="276" r:id="rId18"/>
+    <p:sldId id="270" r:id="rId19"/>
+    <p:sldId id="271" r:id="rId20"/>
+    <p:sldId id="272" r:id="rId21"/>
   </p:sldIdLst>
   <p:sldSz cx="12192000" cy="6858000"/>
   <p:notesSz cx="6858000" cy="9144000"/>
@@ -631,7 +632,7 @@
           <a:p>
             <a:fld id="{48F9BE26-70F7-42CD-A4C9-48BFDA3C5C98}" type="slidenum">
               <a:rPr lang="pt-BR" smtClean="0"/>
-              <a:t>14</a:t>
+              <a:t>15</a:t>
             </a:fld>
             <a:endParaRPr lang="pt-BR"/>
           </a:p>
@@ -5477,6 +5478,49 @@
       </p:grpSpPr>
       <p:sp>
         <p:nvSpPr>
+          <p:cNvPr id="2" name="Título 1">
+            <a:extLst>
+              <a:ext uri="{FF2B5EF4-FFF2-40B4-BE49-F238E27FC236}">
+                <a16:creationId xmlns:a16="http://schemas.microsoft.com/office/drawing/2014/main" id="{6DB6832F-1F40-FEBB-11B9-3EC3E276D3D3}"/>
+              </a:ext>
+            </a:extLst>
+          </p:cNvPr>
+          <p:cNvSpPr>
+            <a:spLocks noGrp="1"/>
+          </p:cNvSpPr>
+          <p:nvPr>
+            <p:ph type="ctrTitle"/>
+          </p:nvPr>
+        </p:nvSpPr>
+        <p:spPr>
+          <a:xfrm>
+            <a:off x="1769805" y="282525"/>
+            <a:ext cx="9144000" cy="825757"/>
+          </a:xfrm>
+        </p:spPr>
+        <p:txBody>
+          <a:bodyPr>
+            <a:normAutofit/>
+          </a:bodyPr>
+          <a:lstStyle/>
+          <a:p>
+            <a:pPr algn="l"/>
+            <a:r>
+              <a:rPr lang="pt-BR" sz="4000" dirty="0" err="1">
+                <a:latin typeface="Arial" panose="020B0604020202020204" pitchFamily="34" charset="0"/>
+                <a:cs typeface="Arial" panose="020B0604020202020204" pitchFamily="34" charset="0"/>
+              </a:rPr>
+              <a:t>Sest</a:t>
+            </a:r>
+            <a:endParaRPr lang="pt-BR" sz="4000" dirty="0">
+              <a:latin typeface="Arial" panose="020B0604020202020204" pitchFamily="34" charset="0"/>
+              <a:cs typeface="Arial" panose="020B0604020202020204" pitchFamily="34" charset="0"/>
+            </a:endParaRPr>
+          </a:p>
+        </p:txBody>
+      </p:sp>
+      <p:sp>
+        <p:nvSpPr>
           <p:cNvPr id="5" name="Retângulo 4">
             <a:extLst>
               <a:ext uri="{FF2B5EF4-FFF2-40B4-BE49-F238E27FC236}">
@@ -5489,7 +5533,7 @@
         </p:nvSpPr>
         <p:spPr>
           <a:xfrm>
-            <a:off x="-2971800" y="-30727"/>
+            <a:off x="0" y="-30727"/>
             <a:ext cx="1769805" cy="6888727"/>
           </a:xfrm>
           <a:prstGeom prst="rect">
@@ -5544,8 +5588,8 @@
         </p:nvSpPr>
         <p:spPr>
           <a:xfrm>
-            <a:off x="-752170" y="4833257"/>
-            <a:ext cx="13804491" cy="6213286"/>
+            <a:off x="-752170" y="7371889"/>
+            <a:ext cx="13804491" cy="3674654"/>
           </a:xfrm>
           <a:prstGeom prst="rect">
             <a:avLst/>
@@ -5587,111 +5631,320 @@
       </p:sp>
       <p:sp>
         <p:nvSpPr>
-          <p:cNvPr id="4" name="Retângulo 3">
-            <a:extLst>
-              <a:ext uri="{FF2B5EF4-FFF2-40B4-BE49-F238E27FC236}">
-                <a16:creationId xmlns:a16="http://schemas.microsoft.com/office/drawing/2014/main" id="{2B28FEAE-D239-4CBC-FBCC-3AA8B7655348}"/>
-              </a:ext>
-            </a:extLst>
-          </p:cNvPr>
-          <p:cNvSpPr/>
+          <p:cNvPr id="4" name="CaixaDeTexto 2">
+            <a:extLst>
+              <a:ext uri="{FF2B5EF4-FFF2-40B4-BE49-F238E27FC236}">
+                <a16:creationId xmlns:a16="http://schemas.microsoft.com/office/drawing/2014/main" id="{8894BAED-96C6-51DE-E6B3-80910D820A91}"/>
+              </a:ext>
+            </a:extLst>
+          </p:cNvPr>
+          <p:cNvSpPr txBox="1"/>
           <p:nvPr/>
         </p:nvSpPr>
         <p:spPr>
-          <a:xfrm rot="5400000">
-            <a:off x="3692718" y="-6235052"/>
-            <a:ext cx="4916135" cy="12583168"/>
+          <a:xfrm>
+            <a:off x="1896950" y="1108282"/>
+            <a:ext cx="9567333" cy="5632311"/>
           </a:xfrm>
           <a:prstGeom prst="rect">
             <a:avLst/>
           </a:prstGeom>
-          <a:solidFill>
-            <a:schemeClr val="tx2">
-              <a:lumMod val="75000"/>
-              <a:lumOff val="25000"/>
-            </a:schemeClr>
-          </a:solidFill>
-          <a:ln>
-            <a:noFill/>
-          </a:ln>
-        </p:spPr>
-        <p:style>
-          <a:lnRef idx="2">
-            <a:schemeClr val="accent1">
-              <a:shade val="15000"/>
-            </a:schemeClr>
-          </a:lnRef>
-          <a:fillRef idx="1">
-            <a:schemeClr val="accent1"/>
-          </a:fillRef>
-          <a:effectRef idx="0">
-            <a:schemeClr val="accent1"/>
-          </a:effectRef>
-          <a:fontRef idx="minor">
-            <a:schemeClr val="lt1"/>
-          </a:fontRef>
-        </p:style>
-        <p:txBody>
-          <a:bodyPr rtlCol="0" anchor="ctr"/>
-          <a:lstStyle/>
-          <a:p>
-            <a:pPr algn="ctr"/>
-            <a:endParaRPr lang="pt-BR"/>
-          </a:p>
-        </p:txBody>
-      </p:sp>
-      <p:pic>
-        <p:nvPicPr>
-          <p:cNvPr id="11" name="Imagem 10">
-            <a:extLst>
-              <a:ext uri="{FF2B5EF4-FFF2-40B4-BE49-F238E27FC236}">
-                <a16:creationId xmlns:a16="http://schemas.microsoft.com/office/drawing/2014/main" id="{8CF1E9C6-CB36-3F72-5770-F68BA65DEDEC}"/>
-              </a:ext>
-            </a:extLst>
-          </p:cNvPr>
-          <p:cNvPicPr>
-            <a:picLocks noChangeAspect="1"/>
-          </p:cNvPicPr>
-          <p:nvPr/>
-        </p:nvPicPr>
-        <p:blipFill>
-          <a:blip r:embed="rId3"/>
-          <a:stretch>
-            <a:fillRect/>
-          </a:stretch>
-        </p:blipFill>
-        <p:spPr>
-          <a:xfrm>
-            <a:off x="1524000" y="2695575"/>
-            <a:ext cx="9144000" cy="1466850"/>
-          </a:xfrm>
-          <a:prstGeom prst="rect">
-            <a:avLst/>
-          </a:prstGeom>
-        </p:spPr>
-      </p:pic>
+          <a:noFill/>
+        </p:spPr>
+        <p:txBody>
+          <a:bodyPr wrap="square" rtlCol="0">
+            <a:spAutoFit/>
+          </a:bodyPr>
+          <a:lstStyle>
+            <a:defPPr>
+              <a:defRPr lang="pt-BR"/>
+            </a:defPPr>
+            <a:lvl1pPr marL="0" algn="l" defTabSz="914400" rtl="0" eaLnBrk="1" latinLnBrk="0" hangingPunct="1">
+              <a:defRPr sz="1800" kern="1200">
+                <a:solidFill>
+                  <a:schemeClr val="tx1"/>
+                </a:solidFill>
+                <a:latin typeface="+mn-lt"/>
+                <a:ea typeface="+mn-ea"/>
+                <a:cs typeface="+mn-cs"/>
+              </a:defRPr>
+            </a:lvl1pPr>
+            <a:lvl2pPr marL="457200" algn="l" defTabSz="914400" rtl="0" eaLnBrk="1" latinLnBrk="0" hangingPunct="1">
+              <a:defRPr sz="1800" kern="1200">
+                <a:solidFill>
+                  <a:schemeClr val="tx1"/>
+                </a:solidFill>
+                <a:latin typeface="+mn-lt"/>
+                <a:ea typeface="+mn-ea"/>
+                <a:cs typeface="+mn-cs"/>
+              </a:defRPr>
+            </a:lvl2pPr>
+            <a:lvl3pPr marL="914400" algn="l" defTabSz="914400" rtl="0" eaLnBrk="1" latinLnBrk="0" hangingPunct="1">
+              <a:defRPr sz="1800" kern="1200">
+                <a:solidFill>
+                  <a:schemeClr val="tx1"/>
+                </a:solidFill>
+                <a:latin typeface="+mn-lt"/>
+                <a:ea typeface="+mn-ea"/>
+                <a:cs typeface="+mn-cs"/>
+              </a:defRPr>
+            </a:lvl3pPr>
+            <a:lvl4pPr marL="1371600" algn="l" defTabSz="914400" rtl="0" eaLnBrk="1" latinLnBrk="0" hangingPunct="1">
+              <a:defRPr sz="1800" kern="1200">
+                <a:solidFill>
+                  <a:schemeClr val="tx1"/>
+                </a:solidFill>
+                <a:latin typeface="+mn-lt"/>
+                <a:ea typeface="+mn-ea"/>
+                <a:cs typeface="+mn-cs"/>
+              </a:defRPr>
+            </a:lvl4pPr>
+            <a:lvl5pPr marL="1828800" algn="l" defTabSz="914400" rtl="0" eaLnBrk="1" latinLnBrk="0" hangingPunct="1">
+              <a:defRPr sz="1800" kern="1200">
+                <a:solidFill>
+                  <a:schemeClr val="tx1"/>
+                </a:solidFill>
+                <a:latin typeface="+mn-lt"/>
+                <a:ea typeface="+mn-ea"/>
+                <a:cs typeface="+mn-cs"/>
+              </a:defRPr>
+            </a:lvl5pPr>
+            <a:lvl6pPr marL="2286000" algn="l" defTabSz="914400" rtl="0" eaLnBrk="1" latinLnBrk="0" hangingPunct="1">
+              <a:defRPr sz="1800" kern="1200">
+                <a:solidFill>
+                  <a:schemeClr val="tx1"/>
+                </a:solidFill>
+                <a:latin typeface="+mn-lt"/>
+                <a:ea typeface="+mn-ea"/>
+                <a:cs typeface="+mn-cs"/>
+              </a:defRPr>
+            </a:lvl6pPr>
+            <a:lvl7pPr marL="2743200" algn="l" defTabSz="914400" rtl="0" eaLnBrk="1" latinLnBrk="0" hangingPunct="1">
+              <a:defRPr sz="1800" kern="1200">
+                <a:solidFill>
+                  <a:schemeClr val="tx1"/>
+                </a:solidFill>
+                <a:latin typeface="+mn-lt"/>
+                <a:ea typeface="+mn-ea"/>
+                <a:cs typeface="+mn-cs"/>
+              </a:defRPr>
+            </a:lvl7pPr>
+            <a:lvl8pPr marL="3200400" algn="l" defTabSz="914400" rtl="0" eaLnBrk="1" latinLnBrk="0" hangingPunct="1">
+              <a:defRPr sz="1800" kern="1200">
+                <a:solidFill>
+                  <a:schemeClr val="tx1"/>
+                </a:solidFill>
+                <a:latin typeface="+mn-lt"/>
+                <a:ea typeface="+mn-ea"/>
+                <a:cs typeface="+mn-cs"/>
+              </a:defRPr>
+            </a:lvl8pPr>
+            <a:lvl9pPr marL="3657600" algn="l" defTabSz="914400" rtl="0" eaLnBrk="1" latinLnBrk="0" hangingPunct="1">
+              <a:defRPr sz="1800" kern="1200">
+                <a:solidFill>
+                  <a:schemeClr val="tx1"/>
+                </a:solidFill>
+                <a:latin typeface="+mn-lt"/>
+                <a:ea typeface="+mn-ea"/>
+                <a:cs typeface="+mn-cs"/>
+              </a:defRPr>
+            </a:lvl9pPr>
+          </a:lstStyle>
+          <a:p>
+            <a:pPr marL="342900" indent="-342900">
+              <a:buFont typeface="Arial" panose="020B0604020202020204" pitchFamily="34" charset="0"/>
+              <a:buChar char="•"/>
+            </a:pPr>
+            <a:r>
+              <a:rPr lang="pt-BR" sz="2000" b="1" dirty="0"/>
+              <a:t>Criação</a:t>
+            </a:r>
+          </a:p>
+          <a:p>
+            <a:pPr marL="800100" lvl="1" indent="-342900">
+              <a:buFont typeface="Arial" panose="020B0604020202020204" pitchFamily="34" charset="0"/>
+              <a:buChar char="•"/>
+            </a:pPr>
+            <a:r>
+              <a:rPr lang="pt-BR" sz="2000" dirty="0"/>
+              <a:t>Criado em 14 de setembro de 1993 pela Lei 8.706.</a:t>
+            </a:r>
+          </a:p>
+          <a:p>
+            <a:pPr marL="800100" lvl="1" indent="-342900">
+              <a:buFont typeface="Arial" panose="020B0604020202020204" pitchFamily="34" charset="0"/>
+              <a:buChar char="•"/>
+            </a:pPr>
+            <a:r>
+              <a:rPr lang="pt-BR" sz="2000" dirty="0"/>
+              <a:t>Entidade sem fins lucrativos focada no setor de transporte.</a:t>
+            </a:r>
+          </a:p>
+          <a:p>
+            <a:pPr marL="342900" indent="-342900">
+              <a:buFont typeface="Arial" panose="020B0604020202020204" pitchFamily="34" charset="0"/>
+              <a:buChar char="•"/>
+            </a:pPr>
+            <a:r>
+              <a:rPr lang="pt-BR" sz="2000" b="1" dirty="0"/>
+              <a:t>Objetivo</a:t>
+            </a:r>
+          </a:p>
+          <a:p>
+            <a:pPr marL="800100" lvl="1" indent="-342900">
+              <a:buFont typeface="Arial" panose="020B0604020202020204" pitchFamily="34" charset="0"/>
+              <a:buChar char="•"/>
+            </a:pPr>
+            <a:r>
+              <a:rPr lang="pt-BR" sz="2000" dirty="0"/>
+              <a:t>Promover a qualidade de vida dos trabalhadores e suas famílias.</a:t>
+            </a:r>
+          </a:p>
+          <a:p>
+            <a:pPr marL="342900" indent="-342900">
+              <a:buFont typeface="Arial" panose="020B0604020202020204" pitchFamily="34" charset="0"/>
+              <a:buChar char="•"/>
+            </a:pPr>
+            <a:r>
+              <a:rPr lang="pt-BR" sz="2000" b="1" dirty="0"/>
+              <a:t>Valores</a:t>
+            </a:r>
+          </a:p>
+          <a:p>
+            <a:pPr marL="800100" lvl="1" indent="-342900">
+              <a:buFont typeface="Arial" panose="020B0604020202020204" pitchFamily="34" charset="0"/>
+              <a:buChar char="•"/>
+            </a:pPr>
+            <a:r>
+              <a:rPr lang="pt-BR" sz="2000" dirty="0"/>
+              <a:t>Solidariedade</a:t>
+            </a:r>
+          </a:p>
+          <a:p>
+            <a:pPr marL="800100" lvl="1" indent="-342900">
+              <a:buFont typeface="Arial" panose="020B0604020202020204" pitchFamily="34" charset="0"/>
+              <a:buChar char="•"/>
+            </a:pPr>
+            <a:r>
+              <a:rPr lang="pt-BR" sz="2000" dirty="0"/>
+              <a:t>Compromisso</a:t>
+            </a:r>
+          </a:p>
+          <a:p>
+            <a:pPr marL="800100" lvl="1" indent="-342900">
+              <a:buFont typeface="Arial" panose="020B0604020202020204" pitchFamily="34" charset="0"/>
+              <a:buChar char="•"/>
+            </a:pPr>
+            <a:r>
+              <a:rPr lang="pt-BR" sz="2000" dirty="0"/>
+              <a:t>Ética</a:t>
+            </a:r>
+          </a:p>
+          <a:p>
+            <a:pPr marL="800100" lvl="1" indent="-342900">
+              <a:buFont typeface="Arial" panose="020B0604020202020204" pitchFamily="34" charset="0"/>
+              <a:buChar char="•"/>
+            </a:pPr>
+            <a:r>
+              <a:rPr lang="pt-BR" sz="2000" dirty="0"/>
+              <a:t>Inovação</a:t>
+            </a:r>
+          </a:p>
+          <a:p>
+            <a:pPr marL="800100" lvl="1" indent="-342900">
+              <a:buFont typeface="Arial" panose="020B0604020202020204" pitchFamily="34" charset="0"/>
+              <a:buChar char="•"/>
+            </a:pPr>
+            <a:r>
+              <a:rPr lang="pt-BR" sz="2000" dirty="0"/>
+              <a:t>Respeito</a:t>
+            </a:r>
+          </a:p>
+          <a:p>
+            <a:pPr marL="342900" indent="-342900">
+              <a:buFont typeface="Arial" panose="020B0604020202020204" pitchFamily="34" charset="0"/>
+              <a:buChar char="•"/>
+            </a:pPr>
+            <a:r>
+              <a:rPr lang="pt-BR" sz="2000" b="1" dirty="0"/>
+              <a:t>Serviços Prestados</a:t>
+            </a:r>
+          </a:p>
+          <a:p>
+            <a:pPr marL="800100" lvl="1" indent="-342900">
+              <a:buFont typeface="Arial" panose="020B0604020202020204" pitchFamily="34" charset="0"/>
+              <a:buChar char="•"/>
+            </a:pPr>
+            <a:r>
+              <a:rPr lang="pt-BR" sz="2000" dirty="0"/>
+              <a:t>Assistência social</a:t>
+            </a:r>
+          </a:p>
+          <a:p>
+            <a:pPr marL="800100" lvl="1" indent="-342900">
+              <a:buFont typeface="Arial" panose="020B0604020202020204" pitchFamily="34" charset="0"/>
+              <a:buChar char="•"/>
+            </a:pPr>
+            <a:r>
+              <a:rPr lang="pt-BR" sz="2000" dirty="0"/>
+              <a:t>Saúde</a:t>
+            </a:r>
+          </a:p>
+          <a:p>
+            <a:pPr marL="800100" lvl="1" indent="-342900">
+              <a:buFont typeface="Arial" panose="020B0604020202020204" pitchFamily="34" charset="0"/>
+              <a:buChar char="•"/>
+            </a:pPr>
+            <a:r>
+              <a:rPr lang="pt-BR" sz="2000" dirty="0"/>
+              <a:t>Capacitação profissional</a:t>
+            </a:r>
+          </a:p>
+          <a:p>
+            <a:pPr marL="800100" lvl="1" indent="-342900">
+              <a:buFont typeface="Arial" panose="020B0604020202020204" pitchFamily="34" charset="0"/>
+              <a:buChar char="•"/>
+            </a:pPr>
+            <a:r>
+              <a:rPr lang="pt-BR" sz="2000" dirty="0"/>
+              <a:t>Lazer</a:t>
+            </a:r>
+          </a:p>
+          <a:p>
+            <a:pPr marL="800100" lvl="1" indent="-342900">
+              <a:buFont typeface="Arial" panose="020B0604020202020204" pitchFamily="34" charset="0"/>
+              <a:buChar char="•"/>
+            </a:pPr>
+            <a:r>
+              <a:rPr lang="pt-BR" sz="2000" dirty="0"/>
+              <a:t>Orientação jurídica</a:t>
+            </a:r>
+          </a:p>
+          <a:p>
+            <a:pPr marL="800100" lvl="1" indent="-342900">
+              <a:buFont typeface="Arial" panose="020B0604020202020204" pitchFamily="34" charset="0"/>
+              <a:buChar char="•"/>
+            </a:pPr>
+            <a:r>
+              <a:rPr lang="pt-BR" sz="2000" dirty="0"/>
+              <a:t>Inclusão social</a:t>
+            </a:r>
+          </a:p>
+        </p:txBody>
+      </p:sp>
     </p:spTree>
     <p:extLst>
       <p:ext uri="{BB962C8B-B14F-4D97-AF65-F5344CB8AC3E}">
-        <p14:creationId xmlns:p14="http://schemas.microsoft.com/office/powerpoint/2010/main" val="1778785139"/>
+        <p14:creationId xmlns:p14="http://schemas.microsoft.com/office/powerpoint/2010/main" val="4040978496"/>
       </p:ext>
     </p:extLst>
   </p:cSld>
   <p:clrMapOvr>
     <a:masterClrMapping/>
   </p:clrMapOvr>
-  <mc:AlternateContent xmlns:mc="http://schemas.openxmlformats.org/markup-compatibility/2006">
-    <mc:Choice xmlns:p15="http://schemas.microsoft.com/office/powerpoint/2012/main" Requires="p15">
-      <p:transition xmlns:p14="http://schemas.microsoft.com/office/powerpoint/2010/main" spd="slow" p14:dur="1250">
-        <p15:prstTrans prst="peelOff"/>
-      </p:transition>
-    </mc:Choice>
-    <mc:Fallback>
-      <p:transition spd="slow">
-        <p:fade/>
-      </p:transition>
-    </mc:Fallback>
-  </mc:AlternateContent>
+  <p:transition spd="slow">
+    <p:push dir="u"/>
+  </p:transition>
 </p:sld>
 </file>
 
@@ -5714,10 +5967,10 @@
       </p:grpSpPr>
       <p:sp>
         <p:nvSpPr>
-          <p:cNvPr id="9" name="Retângulo 8">
-            <a:extLst>
-              <a:ext uri="{FF2B5EF4-FFF2-40B4-BE49-F238E27FC236}">
-                <a16:creationId xmlns:a16="http://schemas.microsoft.com/office/drawing/2014/main" id="{C684D629-A785-598C-40B8-25FB1CC4DF67}"/>
+          <p:cNvPr id="5" name="Retângulo 4">
+            <a:extLst>
+              <a:ext uri="{FF2B5EF4-FFF2-40B4-BE49-F238E27FC236}">
+                <a16:creationId xmlns:a16="http://schemas.microsoft.com/office/drawing/2014/main" id="{DA12847A-22F8-E641-C100-548299DEC00A}"/>
               </a:ext>
             </a:extLst>
           </p:cNvPr>
@@ -5726,8 +5979,8 @@
         </p:nvSpPr>
         <p:spPr>
           <a:xfrm>
-            <a:off x="-806246" y="8523514"/>
-            <a:ext cx="13804491" cy="6213286"/>
+            <a:off x="-2971800" y="-30727"/>
+            <a:ext cx="1769805" cy="6888727"/>
           </a:xfrm>
           <a:prstGeom prst="rect">
             <a:avLst/>
@@ -5769,10 +6022,10 @@
       </p:sp>
       <p:sp>
         <p:nvSpPr>
-          <p:cNvPr id="4" name="Retângulo 3">
-            <a:extLst>
-              <a:ext uri="{FF2B5EF4-FFF2-40B4-BE49-F238E27FC236}">
-                <a16:creationId xmlns:a16="http://schemas.microsoft.com/office/drawing/2014/main" id="{2B28FEAE-D239-4CBC-FBCC-3AA8B7655348}"/>
+          <p:cNvPr id="9" name="Retângulo 8">
+            <a:extLst>
+              <a:ext uri="{FF2B5EF4-FFF2-40B4-BE49-F238E27FC236}">
+                <a16:creationId xmlns:a16="http://schemas.microsoft.com/office/drawing/2014/main" id="{C684D629-A785-598C-40B8-25FB1CC4DF67}"/>
               </a:ext>
             </a:extLst>
           </p:cNvPr>
@@ -5780,9 +6033,9 @@
           <p:nvPr/>
         </p:nvSpPr>
         <p:spPr>
-          <a:xfrm rot="5400000">
-            <a:off x="3637933" y="-9762024"/>
-            <a:ext cx="4916135" cy="12583168"/>
+          <a:xfrm>
+            <a:off x="-752170" y="4833257"/>
+            <a:ext cx="13804491" cy="6213286"/>
           </a:xfrm>
           <a:prstGeom prst="rect">
             <a:avLst/>
@@ -5824,100 +6077,10 @@
       </p:sp>
       <p:sp>
         <p:nvSpPr>
-          <p:cNvPr id="2" name="Título 1">
-            <a:extLst>
-              <a:ext uri="{FF2B5EF4-FFF2-40B4-BE49-F238E27FC236}">
-                <a16:creationId xmlns:a16="http://schemas.microsoft.com/office/drawing/2014/main" id="{A08F1F2F-C6D8-255D-B06F-3537956757DD}"/>
-              </a:ext>
-            </a:extLst>
-          </p:cNvPr>
-          <p:cNvSpPr>
-            <a:spLocks noGrp="1"/>
-          </p:cNvSpPr>
-          <p:nvPr>
-            <p:ph type="ctrTitle"/>
-          </p:nvPr>
-        </p:nvSpPr>
-        <p:spPr>
-          <a:xfrm>
-            <a:off x="643467" y="470096"/>
-            <a:ext cx="9144000" cy="825757"/>
-          </a:xfrm>
-        </p:spPr>
-        <p:txBody>
-          <a:bodyPr>
-            <a:normAutofit/>
-          </a:bodyPr>
-          <a:lstStyle/>
-          <a:p>
-            <a:pPr algn="l"/>
-            <a:r>
-              <a:rPr lang="pt-BR" sz="4000" dirty="0">
-                <a:latin typeface="Arial" panose="020B0604020202020204" pitchFamily="34" charset="0"/>
-                <a:cs typeface="Arial" panose="020B0604020202020204" pitchFamily="34" charset="0"/>
-              </a:rPr>
-              <a:t>Situação:</a:t>
-            </a:r>
-          </a:p>
-        </p:txBody>
-      </p:sp>
-      <p:sp>
-        <p:nvSpPr>
-          <p:cNvPr id="3" name="CaixaDeTexto 2">
-            <a:extLst>
-              <a:ext uri="{FF2B5EF4-FFF2-40B4-BE49-F238E27FC236}">
-                <a16:creationId xmlns:a16="http://schemas.microsoft.com/office/drawing/2014/main" id="{6877F86F-6DF0-1424-732E-018B521369DD}"/>
-              </a:ext>
-            </a:extLst>
-          </p:cNvPr>
-          <p:cNvSpPr txBox="1"/>
-          <p:nvPr/>
-        </p:nvSpPr>
-        <p:spPr>
-          <a:xfrm>
-            <a:off x="643467" y="1540933"/>
-            <a:ext cx="10397065" cy="2308324"/>
-          </a:xfrm>
-          <a:prstGeom prst="rect">
-            <a:avLst/>
-          </a:prstGeom>
-          <a:noFill/>
-        </p:spPr>
-        <p:txBody>
-          <a:bodyPr wrap="square" rtlCol="0">
-            <a:spAutoFit/>
-          </a:bodyPr>
-          <a:lstStyle/>
-          <a:p>
-            <a:r>
-              <a:rPr lang="pt-BR" sz="2400" dirty="0">
-                <a:solidFill>
-                  <a:srgbClr val="000000"/>
-                </a:solidFill>
-                <a:latin typeface="Arial" panose="020B0604020202020204" pitchFamily="34" charset="0"/>
-              </a:rPr>
-              <a:t>Somos funcionários de uma empresa de fabricação de computadores, </a:t>
-            </a:r>
-            <a:r>
-              <a:rPr lang="pt-BR" sz="2400" b="0" i="0" u="none" strike="noStrike" dirty="0">
-                <a:solidFill>
-                  <a:srgbClr val="000000"/>
-                </a:solidFill>
-                <a:effectLst/>
-                <a:latin typeface="Arial" panose="020B0604020202020204" pitchFamily="34" charset="0"/>
-              </a:rPr>
-              <a:t>que já está consolidada no mercado, entretanto estamos enfrentando o surgimento de novas tecnologias disruptivas, como dispositivos com inteligência artificial, Internet das Coisas (IoT) e manufatura aditiva (impressão 3D), que estão mudando radicalmente as expectativas dos clientes e os processos de produção.</a:t>
-            </a:r>
-            <a:endParaRPr lang="pt-BR" sz="2400" dirty="0"/>
-          </a:p>
-        </p:txBody>
-      </p:sp>
-      <p:sp>
-        <p:nvSpPr>
-          <p:cNvPr id="6" name="Retângulo 5">
-            <a:extLst>
-              <a:ext uri="{FF2B5EF4-FFF2-40B4-BE49-F238E27FC236}">
-                <a16:creationId xmlns:a16="http://schemas.microsoft.com/office/drawing/2014/main" id="{A30AD9C1-DBBD-0BF2-817F-C708D525200C}"/>
+          <p:cNvPr id="4" name="Retângulo 3">
+            <a:extLst>
+              <a:ext uri="{FF2B5EF4-FFF2-40B4-BE49-F238E27FC236}">
+                <a16:creationId xmlns:a16="http://schemas.microsoft.com/office/drawing/2014/main" id="{2B28FEAE-D239-4CBC-FBCC-3AA8B7655348}"/>
               </a:ext>
             </a:extLst>
           </p:cNvPr>
@@ -5926,8 +6089,8 @@
         </p:nvSpPr>
         <p:spPr>
           <a:xfrm rot="5400000">
-            <a:off x="9314341" y="2227742"/>
-            <a:ext cx="6864451" cy="2396065"/>
+            <a:off x="3692718" y="-6235052"/>
+            <a:ext cx="4916135" cy="12583168"/>
           </a:xfrm>
           <a:prstGeom prst="rect">
             <a:avLst/>
@@ -5967,23 +6130,53 @@
           </a:p>
         </p:txBody>
       </p:sp>
+      <p:pic>
+        <p:nvPicPr>
+          <p:cNvPr id="11" name="Imagem 10">
+            <a:extLst>
+              <a:ext uri="{FF2B5EF4-FFF2-40B4-BE49-F238E27FC236}">
+                <a16:creationId xmlns:a16="http://schemas.microsoft.com/office/drawing/2014/main" id="{8CF1E9C6-CB36-3F72-5770-F68BA65DEDEC}"/>
+              </a:ext>
+            </a:extLst>
+          </p:cNvPr>
+          <p:cNvPicPr>
+            <a:picLocks noChangeAspect="1"/>
+          </p:cNvPicPr>
+          <p:nvPr/>
+        </p:nvPicPr>
+        <p:blipFill>
+          <a:blip r:embed="rId3"/>
+          <a:stretch>
+            <a:fillRect/>
+          </a:stretch>
+        </p:blipFill>
+        <p:spPr>
+          <a:xfrm>
+            <a:off x="1524000" y="2695575"/>
+            <a:ext cx="9144000" cy="1466850"/>
+          </a:xfrm>
+          <a:prstGeom prst="rect">
+            <a:avLst/>
+          </a:prstGeom>
+        </p:spPr>
+      </p:pic>
     </p:spTree>
     <p:extLst>
       <p:ext uri="{BB962C8B-B14F-4D97-AF65-F5344CB8AC3E}">
-        <p14:creationId xmlns:p14="http://schemas.microsoft.com/office/powerpoint/2010/main" val="379059689"/>
+        <p14:creationId xmlns:p14="http://schemas.microsoft.com/office/powerpoint/2010/main" val="1778785139"/>
       </p:ext>
     </p:extLst>
   </p:cSld>
   <p:clrMapOvr>
     <a:masterClrMapping/>
   </p:clrMapOvr>
-  <mc:AlternateContent xmlns:mc="http://schemas.openxmlformats.org/markup-compatibility/2006">
-    <mc:Choice xmlns:p159="http://schemas.microsoft.com/office/powerpoint/2015/09/main" Requires="p159">
-      <p:transition xmlns:p14="http://schemas.microsoft.com/office/powerpoint/2010/main" spd="slow" p14:dur="2000">
-        <p159:morph option="byObject"/>
+  <mc:AlternateContent xmlns:mc="http://schemas.openxmlformats.org/markup-compatibility/2006" xmlns:p15="http://schemas.microsoft.com/office/powerpoint/2012/main">
+    <mc:Choice Requires="p15">
+      <p:transition xmlns:p14="http://schemas.microsoft.com/office/powerpoint/2010/main" spd="slow" p14:dur="1250">
+        <p15:prstTrans prst="peelOff"/>
       </p:transition>
     </mc:Choice>
-    <mc:Fallback>
+    <mc:Fallback xmlns="">
       <p:transition spd="slow">
         <p:fade/>
       </p:transition>
@@ -6011,10 +6204,10 @@
       </p:grpSpPr>
       <p:sp>
         <p:nvSpPr>
-          <p:cNvPr id="5" name="Retângulo 4">
-            <a:extLst>
-              <a:ext uri="{FF2B5EF4-FFF2-40B4-BE49-F238E27FC236}">
-                <a16:creationId xmlns:a16="http://schemas.microsoft.com/office/drawing/2014/main" id="{DA12847A-22F8-E641-C100-548299DEC00A}"/>
+          <p:cNvPr id="9" name="Retângulo 8">
+            <a:extLst>
+              <a:ext uri="{FF2B5EF4-FFF2-40B4-BE49-F238E27FC236}">
+                <a16:creationId xmlns:a16="http://schemas.microsoft.com/office/drawing/2014/main" id="{C684D629-A785-598C-40B8-25FB1CC4DF67}"/>
               </a:ext>
             </a:extLst>
           </p:cNvPr>
@@ -6023,8 +6216,8 @@
         </p:nvSpPr>
         <p:spPr>
           <a:xfrm>
-            <a:off x="11502682" y="-129664"/>
-            <a:ext cx="1769805" cy="7117327"/>
+            <a:off x="-806246" y="8523514"/>
+            <a:ext cx="13804491" cy="6213286"/>
           </a:xfrm>
           <a:prstGeom prst="rect">
             <a:avLst/>
@@ -6066,10 +6259,10 @@
       </p:sp>
       <p:sp>
         <p:nvSpPr>
-          <p:cNvPr id="9" name="Retângulo 8">
-            <a:extLst>
-              <a:ext uri="{FF2B5EF4-FFF2-40B4-BE49-F238E27FC236}">
-                <a16:creationId xmlns:a16="http://schemas.microsoft.com/office/drawing/2014/main" id="{C684D629-A785-598C-40B8-25FB1CC4DF67}"/>
+          <p:cNvPr id="4" name="Retângulo 3">
+            <a:extLst>
+              <a:ext uri="{FF2B5EF4-FFF2-40B4-BE49-F238E27FC236}">
+                <a16:creationId xmlns:a16="http://schemas.microsoft.com/office/drawing/2014/main" id="{2B28FEAE-D239-4CBC-FBCC-3AA8B7655348}"/>
               </a:ext>
             </a:extLst>
           </p:cNvPr>
@@ -6077,9 +6270,9 @@
           <p:nvPr/>
         </p:nvSpPr>
         <p:spPr>
-          <a:xfrm>
-            <a:off x="-806246" y="8523514"/>
-            <a:ext cx="13804491" cy="6213286"/>
+          <a:xfrm rot="5400000">
+            <a:off x="3637933" y="-9762024"/>
+            <a:ext cx="4916135" cy="12583168"/>
           </a:xfrm>
           <a:prstGeom prst="rect">
             <a:avLst/>
@@ -6121,10 +6314,100 @@
       </p:sp>
       <p:sp>
         <p:nvSpPr>
-          <p:cNvPr id="4" name="Retângulo 3">
-            <a:extLst>
-              <a:ext uri="{FF2B5EF4-FFF2-40B4-BE49-F238E27FC236}">
-                <a16:creationId xmlns:a16="http://schemas.microsoft.com/office/drawing/2014/main" id="{2B28FEAE-D239-4CBC-FBCC-3AA8B7655348}"/>
+          <p:cNvPr id="2" name="Título 1">
+            <a:extLst>
+              <a:ext uri="{FF2B5EF4-FFF2-40B4-BE49-F238E27FC236}">
+                <a16:creationId xmlns:a16="http://schemas.microsoft.com/office/drawing/2014/main" id="{A08F1F2F-C6D8-255D-B06F-3537956757DD}"/>
+              </a:ext>
+            </a:extLst>
+          </p:cNvPr>
+          <p:cNvSpPr>
+            <a:spLocks noGrp="1"/>
+          </p:cNvSpPr>
+          <p:nvPr>
+            <p:ph type="ctrTitle"/>
+          </p:nvPr>
+        </p:nvSpPr>
+        <p:spPr>
+          <a:xfrm>
+            <a:off x="643467" y="470096"/>
+            <a:ext cx="9144000" cy="825757"/>
+          </a:xfrm>
+        </p:spPr>
+        <p:txBody>
+          <a:bodyPr>
+            <a:normAutofit/>
+          </a:bodyPr>
+          <a:lstStyle/>
+          <a:p>
+            <a:pPr algn="l"/>
+            <a:r>
+              <a:rPr lang="pt-BR" sz="4000" dirty="0">
+                <a:latin typeface="Arial" panose="020B0604020202020204" pitchFamily="34" charset="0"/>
+                <a:cs typeface="Arial" panose="020B0604020202020204" pitchFamily="34" charset="0"/>
+              </a:rPr>
+              <a:t>Situação:</a:t>
+            </a:r>
+          </a:p>
+        </p:txBody>
+      </p:sp>
+      <p:sp>
+        <p:nvSpPr>
+          <p:cNvPr id="3" name="CaixaDeTexto 2">
+            <a:extLst>
+              <a:ext uri="{FF2B5EF4-FFF2-40B4-BE49-F238E27FC236}">
+                <a16:creationId xmlns:a16="http://schemas.microsoft.com/office/drawing/2014/main" id="{6877F86F-6DF0-1424-732E-018B521369DD}"/>
+              </a:ext>
+            </a:extLst>
+          </p:cNvPr>
+          <p:cNvSpPr txBox="1"/>
+          <p:nvPr/>
+        </p:nvSpPr>
+        <p:spPr>
+          <a:xfrm>
+            <a:off x="643467" y="1540933"/>
+            <a:ext cx="10397065" cy="2308324"/>
+          </a:xfrm>
+          <a:prstGeom prst="rect">
+            <a:avLst/>
+          </a:prstGeom>
+          <a:noFill/>
+        </p:spPr>
+        <p:txBody>
+          <a:bodyPr wrap="square" rtlCol="0">
+            <a:spAutoFit/>
+          </a:bodyPr>
+          <a:lstStyle/>
+          <a:p>
+            <a:r>
+              <a:rPr lang="pt-BR" sz="2400" dirty="0">
+                <a:solidFill>
+                  <a:srgbClr val="000000"/>
+                </a:solidFill>
+                <a:latin typeface="Arial" panose="020B0604020202020204" pitchFamily="34" charset="0"/>
+              </a:rPr>
+              <a:t>Somos funcionários de uma empresa de fabricação de computadores, </a:t>
+            </a:r>
+            <a:r>
+              <a:rPr lang="pt-BR" sz="2400" b="0" i="0" u="none" strike="noStrike" dirty="0">
+                <a:solidFill>
+                  <a:srgbClr val="000000"/>
+                </a:solidFill>
+                <a:effectLst/>
+                <a:latin typeface="Arial" panose="020B0604020202020204" pitchFamily="34" charset="0"/>
+              </a:rPr>
+              <a:t>que já está consolidada no mercado, entretanto estamos enfrentando o surgimento de novas tecnologias disruptivas, como dispositivos com inteligência artificial, Internet das Coisas (IoT) e manufatura aditiva (impressão 3D), que estão mudando radicalmente as expectativas dos clientes e os processos de produção.</a:t>
+            </a:r>
+            <a:endParaRPr lang="pt-BR" sz="2400" dirty="0"/>
+          </a:p>
+        </p:txBody>
+      </p:sp>
+      <p:sp>
+        <p:nvSpPr>
+          <p:cNvPr id="6" name="Retângulo 5">
+            <a:extLst>
+              <a:ext uri="{FF2B5EF4-FFF2-40B4-BE49-F238E27FC236}">
+                <a16:creationId xmlns:a16="http://schemas.microsoft.com/office/drawing/2014/main" id="{A30AD9C1-DBBD-0BF2-817F-C708D525200C}"/>
               </a:ext>
             </a:extLst>
           </p:cNvPr>
@@ -6133,8 +6416,8 @@
         </p:nvSpPr>
         <p:spPr>
           <a:xfrm rot="5400000">
-            <a:off x="3637933" y="-9762024"/>
-            <a:ext cx="4916135" cy="12583168"/>
+            <a:off x="9314341" y="2227742"/>
+            <a:ext cx="6864451" cy="2396065"/>
           </a:xfrm>
           <a:prstGeom prst="rect">
             <a:avLst/>
@@ -6174,178 +6457,28 @@
           </a:p>
         </p:txBody>
       </p:sp>
-      <p:sp>
-        <p:nvSpPr>
-          <p:cNvPr id="8" name="Título 1">
-            <a:extLst>
-              <a:ext uri="{FF2B5EF4-FFF2-40B4-BE49-F238E27FC236}">
-                <a16:creationId xmlns:a16="http://schemas.microsoft.com/office/drawing/2014/main" id="{72E3FF97-61AB-69B1-A7BC-68339B766E2B}"/>
-              </a:ext>
-            </a:extLst>
-          </p:cNvPr>
-          <p:cNvSpPr>
-            <a:spLocks noGrp="1"/>
-          </p:cNvSpPr>
-          <p:nvPr>
-            <p:ph type="ctrTitle"/>
-          </p:nvPr>
-        </p:nvSpPr>
-        <p:spPr>
-          <a:xfrm>
-            <a:off x="643467" y="470096"/>
-            <a:ext cx="9144000" cy="825757"/>
-          </a:xfrm>
-        </p:spPr>
-        <p:txBody>
-          <a:bodyPr>
-            <a:normAutofit/>
-          </a:bodyPr>
-          <a:lstStyle/>
-          <a:p>
-            <a:pPr algn="l"/>
-            <a:r>
-              <a:rPr lang="pt-BR" sz="4000" dirty="0">
-                <a:latin typeface="Arial" panose="020B0604020202020204" pitchFamily="34" charset="0"/>
-                <a:cs typeface="Arial" panose="020B0604020202020204" pitchFamily="34" charset="0"/>
-              </a:rPr>
-              <a:t>Primeiros passos:</a:t>
-            </a:r>
-          </a:p>
-        </p:txBody>
-      </p:sp>
-      <p:sp>
-        <p:nvSpPr>
-          <p:cNvPr id="10" name="CaixaDeTexto 9">
-            <a:extLst>
-              <a:ext uri="{FF2B5EF4-FFF2-40B4-BE49-F238E27FC236}">
-                <a16:creationId xmlns:a16="http://schemas.microsoft.com/office/drawing/2014/main" id="{8000C949-75C0-93D5-0BF1-340429570320}"/>
-              </a:ext>
-            </a:extLst>
-          </p:cNvPr>
-          <p:cNvSpPr txBox="1"/>
-          <p:nvPr/>
-        </p:nvSpPr>
-        <p:spPr>
-          <a:xfrm>
-            <a:off x="643467" y="1540933"/>
-            <a:ext cx="10397065" cy="2308324"/>
-          </a:xfrm>
-          <a:prstGeom prst="rect">
-            <a:avLst/>
-          </a:prstGeom>
-          <a:noFill/>
-        </p:spPr>
-        <p:txBody>
-          <a:bodyPr wrap="square" rtlCol="0">
-            <a:spAutoFit/>
-          </a:bodyPr>
-          <a:lstStyle/>
-          <a:p>
-            <a:pPr marL="342900" indent="-342900">
-              <a:buFont typeface="Arial" panose="020B0604020202020204" pitchFamily="34" charset="0"/>
-              <a:buChar char="•"/>
-            </a:pPr>
-            <a:r>
-              <a:rPr lang="pt-BR" sz="2400" dirty="0">
-                <a:solidFill>
-                  <a:srgbClr val="000000"/>
-                </a:solidFill>
-                <a:latin typeface="Arial" panose="020B0604020202020204" pitchFamily="34" charset="0"/>
-              </a:rPr>
-              <a:t>Análise do mercado e tendência tecnológicas;</a:t>
-            </a:r>
-          </a:p>
-          <a:p>
-            <a:pPr marL="342900" indent="-342900">
-              <a:buFont typeface="Arial" panose="020B0604020202020204" pitchFamily="34" charset="0"/>
-              <a:buChar char="•"/>
-            </a:pPr>
-            <a:r>
-              <a:rPr lang="pt-BR" sz="2400" dirty="0">
-                <a:solidFill>
-                  <a:srgbClr val="000000"/>
-                </a:solidFill>
-                <a:latin typeface="Arial" panose="020B0604020202020204" pitchFamily="34" charset="0"/>
-              </a:rPr>
-              <a:t>Investimento em inovação com a criação do departamento de P&amp;D;</a:t>
-            </a:r>
-          </a:p>
-          <a:p>
-            <a:pPr marL="342900" indent="-342900">
-              <a:buFont typeface="Arial" panose="020B0604020202020204" pitchFamily="34" charset="0"/>
-              <a:buChar char="•"/>
-            </a:pPr>
-            <a:r>
-              <a:rPr lang="pt-BR" sz="2400" dirty="0">
-                <a:solidFill>
-                  <a:srgbClr val="000000"/>
-                </a:solidFill>
-                <a:latin typeface="Arial" panose="020B0604020202020204" pitchFamily="34" charset="0"/>
-              </a:rPr>
-              <a:t>Capacitação da equipe;</a:t>
-            </a:r>
-          </a:p>
-          <a:p>
-            <a:pPr marL="342900" indent="-342900">
-              <a:buFont typeface="Arial" panose="020B0604020202020204" pitchFamily="34" charset="0"/>
-              <a:buChar char="•"/>
-            </a:pPr>
-            <a:r>
-              <a:rPr lang="pt-BR" sz="2400" dirty="0">
-                <a:solidFill>
-                  <a:srgbClr val="000000"/>
-                </a:solidFill>
-                <a:latin typeface="Arial" panose="020B0604020202020204" pitchFamily="34" charset="0"/>
-              </a:rPr>
-              <a:t>Adaptação do produto e processos;</a:t>
-            </a:r>
-          </a:p>
-          <a:p>
-            <a:pPr marL="342900" indent="-342900">
-              <a:buFont typeface="Arial" panose="020B0604020202020204" pitchFamily="34" charset="0"/>
-              <a:buChar char="•"/>
-            </a:pPr>
-            <a:r>
-              <a:rPr lang="pt-BR" sz="2400" dirty="0">
-                <a:solidFill>
-                  <a:srgbClr val="000000"/>
-                </a:solidFill>
-                <a:latin typeface="Arial" panose="020B0604020202020204" pitchFamily="34" charset="0"/>
-              </a:rPr>
-              <a:t>Estratégia de marketing e reposicionamento;</a:t>
-            </a:r>
-          </a:p>
-          <a:p>
-            <a:pPr marL="342900" indent="-342900">
-              <a:buFont typeface="Arial" panose="020B0604020202020204" pitchFamily="34" charset="0"/>
-              <a:buChar char="•"/>
-            </a:pPr>
-            <a:r>
-              <a:rPr lang="pt-BR" sz="2400" dirty="0">
-                <a:solidFill>
-                  <a:srgbClr val="000000"/>
-                </a:solidFill>
-                <a:latin typeface="Arial" panose="020B0604020202020204" pitchFamily="34" charset="0"/>
-              </a:rPr>
-              <a:t>Plano de implementação gradual e testes de aceitação. </a:t>
-            </a:r>
-            <a:endParaRPr lang="pt-BR" sz="2400" dirty="0"/>
-          </a:p>
-        </p:txBody>
-      </p:sp>
     </p:spTree>
     <p:extLst>
       <p:ext uri="{BB962C8B-B14F-4D97-AF65-F5344CB8AC3E}">
-        <p14:creationId xmlns:p14="http://schemas.microsoft.com/office/powerpoint/2010/main" val="3953366487"/>
+        <p14:creationId xmlns:p14="http://schemas.microsoft.com/office/powerpoint/2010/main" val="379059689"/>
       </p:ext>
     </p:extLst>
   </p:cSld>
   <p:clrMapOvr>
     <a:masterClrMapping/>
   </p:clrMapOvr>
-  <p:transition spd="slow">
-    <p:push dir="u"/>
-  </p:transition>
+  <mc:AlternateContent xmlns:mc="http://schemas.openxmlformats.org/markup-compatibility/2006" xmlns:p159="http://schemas.microsoft.com/office/powerpoint/2015/09/main">
+    <mc:Choice Requires="p159">
+      <p:transition xmlns:p14="http://schemas.microsoft.com/office/powerpoint/2010/main" spd="slow" p14:dur="2000">
+        <p159:morph option="byObject"/>
+      </p:transition>
+    </mc:Choice>
+    <mc:Fallback xmlns="">
+      <p:transition spd="slow">
+        <p:fade/>
+      </p:transition>
+    </mc:Fallback>
+  </mc:AlternateContent>
 </p:sld>
 </file>
 
@@ -6368,45 +6501,6 @@
       </p:grpSpPr>
       <p:sp>
         <p:nvSpPr>
-          <p:cNvPr id="2" name="Título 1">
-            <a:extLst>
-              <a:ext uri="{FF2B5EF4-FFF2-40B4-BE49-F238E27FC236}">
-                <a16:creationId xmlns:a16="http://schemas.microsoft.com/office/drawing/2014/main" id="{6DB6832F-1F40-FEBB-11B9-3EC3E276D3D3}"/>
-              </a:ext>
-            </a:extLst>
-          </p:cNvPr>
-          <p:cNvSpPr>
-            <a:spLocks noGrp="1"/>
-          </p:cNvSpPr>
-          <p:nvPr>
-            <p:ph type="ctrTitle"/>
-          </p:nvPr>
-        </p:nvSpPr>
-        <p:spPr>
-          <a:xfrm>
-            <a:off x="643467" y="470096"/>
-            <a:ext cx="9144000" cy="825757"/>
-          </a:xfrm>
-        </p:spPr>
-        <p:txBody>
-          <a:bodyPr>
-            <a:normAutofit/>
-          </a:bodyPr>
-          <a:lstStyle/>
-          <a:p>
-            <a:pPr algn="l"/>
-            <a:r>
-              <a:rPr lang="pt-BR" sz="4000" dirty="0">
-                <a:latin typeface="Arial" panose="020B0604020202020204" pitchFamily="34" charset="0"/>
-                <a:cs typeface="Arial" panose="020B0604020202020204" pitchFamily="34" charset="0"/>
-              </a:rPr>
-              <a:t>Solução</a:t>
-            </a:r>
-          </a:p>
-        </p:txBody>
-      </p:sp>
-      <p:sp>
-        <p:nvSpPr>
           <p:cNvPr id="5" name="Retângulo 4">
             <a:extLst>
               <a:ext uri="{FF2B5EF4-FFF2-40B4-BE49-F238E27FC236}">
@@ -6419,8 +6513,8 @@
         </p:nvSpPr>
         <p:spPr>
           <a:xfrm>
-            <a:off x="11463866" y="-169333"/>
-            <a:ext cx="846667" cy="7027333"/>
+            <a:off x="11502682" y="-129664"/>
+            <a:ext cx="1769805" cy="7117327"/>
           </a:xfrm>
           <a:prstGeom prst="rect">
             <a:avLst/>
@@ -6462,10 +6556,159 @@
       </p:sp>
       <p:sp>
         <p:nvSpPr>
-          <p:cNvPr id="3" name="CaixaDeTexto 2">
-            <a:extLst>
-              <a:ext uri="{FF2B5EF4-FFF2-40B4-BE49-F238E27FC236}">
-                <a16:creationId xmlns:a16="http://schemas.microsoft.com/office/drawing/2014/main" id="{ADA10E72-79B3-7FD6-3C20-5B04E02E1741}"/>
+          <p:cNvPr id="9" name="Retângulo 8">
+            <a:extLst>
+              <a:ext uri="{FF2B5EF4-FFF2-40B4-BE49-F238E27FC236}">
+                <a16:creationId xmlns:a16="http://schemas.microsoft.com/office/drawing/2014/main" id="{C684D629-A785-598C-40B8-25FB1CC4DF67}"/>
+              </a:ext>
+            </a:extLst>
+          </p:cNvPr>
+          <p:cNvSpPr/>
+          <p:nvPr/>
+        </p:nvSpPr>
+        <p:spPr>
+          <a:xfrm>
+            <a:off x="-806246" y="8523514"/>
+            <a:ext cx="13804491" cy="6213286"/>
+          </a:xfrm>
+          <a:prstGeom prst="rect">
+            <a:avLst/>
+          </a:prstGeom>
+          <a:solidFill>
+            <a:schemeClr val="tx2">
+              <a:lumMod val="75000"/>
+              <a:lumOff val="25000"/>
+            </a:schemeClr>
+          </a:solidFill>
+          <a:ln>
+            <a:noFill/>
+          </a:ln>
+        </p:spPr>
+        <p:style>
+          <a:lnRef idx="2">
+            <a:schemeClr val="accent1">
+              <a:shade val="15000"/>
+            </a:schemeClr>
+          </a:lnRef>
+          <a:fillRef idx="1">
+            <a:schemeClr val="accent1"/>
+          </a:fillRef>
+          <a:effectRef idx="0">
+            <a:schemeClr val="accent1"/>
+          </a:effectRef>
+          <a:fontRef idx="minor">
+            <a:schemeClr val="lt1"/>
+          </a:fontRef>
+        </p:style>
+        <p:txBody>
+          <a:bodyPr rtlCol="0" anchor="ctr"/>
+          <a:lstStyle/>
+          <a:p>
+            <a:pPr algn="ctr"/>
+            <a:endParaRPr lang="pt-BR"/>
+          </a:p>
+        </p:txBody>
+      </p:sp>
+      <p:sp>
+        <p:nvSpPr>
+          <p:cNvPr id="4" name="Retângulo 3">
+            <a:extLst>
+              <a:ext uri="{FF2B5EF4-FFF2-40B4-BE49-F238E27FC236}">
+                <a16:creationId xmlns:a16="http://schemas.microsoft.com/office/drawing/2014/main" id="{2B28FEAE-D239-4CBC-FBCC-3AA8B7655348}"/>
+              </a:ext>
+            </a:extLst>
+          </p:cNvPr>
+          <p:cNvSpPr/>
+          <p:nvPr/>
+        </p:nvSpPr>
+        <p:spPr>
+          <a:xfrm rot="5400000">
+            <a:off x="3637933" y="-9762024"/>
+            <a:ext cx="4916135" cy="12583168"/>
+          </a:xfrm>
+          <a:prstGeom prst="rect">
+            <a:avLst/>
+          </a:prstGeom>
+          <a:solidFill>
+            <a:schemeClr val="tx2">
+              <a:lumMod val="75000"/>
+              <a:lumOff val="25000"/>
+            </a:schemeClr>
+          </a:solidFill>
+          <a:ln>
+            <a:noFill/>
+          </a:ln>
+        </p:spPr>
+        <p:style>
+          <a:lnRef idx="2">
+            <a:schemeClr val="accent1">
+              <a:shade val="15000"/>
+            </a:schemeClr>
+          </a:lnRef>
+          <a:fillRef idx="1">
+            <a:schemeClr val="accent1"/>
+          </a:fillRef>
+          <a:effectRef idx="0">
+            <a:schemeClr val="accent1"/>
+          </a:effectRef>
+          <a:fontRef idx="minor">
+            <a:schemeClr val="lt1"/>
+          </a:fontRef>
+        </p:style>
+        <p:txBody>
+          <a:bodyPr rtlCol="0" anchor="ctr"/>
+          <a:lstStyle/>
+          <a:p>
+            <a:pPr algn="ctr"/>
+            <a:endParaRPr lang="pt-BR"/>
+          </a:p>
+        </p:txBody>
+      </p:sp>
+      <p:sp>
+        <p:nvSpPr>
+          <p:cNvPr id="8" name="Título 1">
+            <a:extLst>
+              <a:ext uri="{FF2B5EF4-FFF2-40B4-BE49-F238E27FC236}">
+                <a16:creationId xmlns:a16="http://schemas.microsoft.com/office/drawing/2014/main" id="{72E3FF97-61AB-69B1-A7BC-68339B766E2B}"/>
+              </a:ext>
+            </a:extLst>
+          </p:cNvPr>
+          <p:cNvSpPr>
+            <a:spLocks noGrp="1"/>
+          </p:cNvSpPr>
+          <p:nvPr>
+            <p:ph type="ctrTitle"/>
+          </p:nvPr>
+        </p:nvSpPr>
+        <p:spPr>
+          <a:xfrm>
+            <a:off x="643467" y="470096"/>
+            <a:ext cx="9144000" cy="825757"/>
+          </a:xfrm>
+        </p:spPr>
+        <p:txBody>
+          <a:bodyPr>
+            <a:normAutofit/>
+          </a:bodyPr>
+          <a:lstStyle/>
+          <a:p>
+            <a:pPr algn="l"/>
+            <a:r>
+              <a:rPr lang="pt-BR" sz="4000" dirty="0">
+                <a:latin typeface="Arial" panose="020B0604020202020204" pitchFamily="34" charset="0"/>
+                <a:cs typeface="Arial" panose="020B0604020202020204" pitchFamily="34" charset="0"/>
+              </a:rPr>
+              <a:t>Primeiros passos:</a:t>
+            </a:r>
+          </a:p>
+        </p:txBody>
+      </p:sp>
+      <p:sp>
+        <p:nvSpPr>
+          <p:cNvPr id="10" name="CaixaDeTexto 9">
+            <a:extLst>
+              <a:ext uri="{FF2B5EF4-FFF2-40B4-BE49-F238E27FC236}">
+                <a16:creationId xmlns:a16="http://schemas.microsoft.com/office/drawing/2014/main" id="{8000C949-75C0-93D5-0BF1-340429570320}"/>
               </a:ext>
             </a:extLst>
           </p:cNvPr>
@@ -6474,8 +6717,8 @@
         </p:nvSpPr>
         <p:spPr>
           <a:xfrm>
-            <a:off x="643467" y="1295853"/>
-            <a:ext cx="10397065" cy="5386090"/>
+            <a:off x="643467" y="1540933"/>
+            <a:ext cx="10397065" cy="2308324"/>
           </a:xfrm>
           <a:prstGeom prst="rect">
             <a:avLst/>
@@ -6488,92 +6731,18 @@
           </a:bodyPr>
           <a:lstStyle/>
           <a:p>
-            <a:r>
-              <a:rPr lang="pt-BR" sz="2000" b="1" dirty="0"/>
-              <a:t>Criação de um Site Educacional sobre Inteligência Artificial</a:t>
-            </a:r>
-          </a:p>
-          <a:p>
             <a:pPr marL="342900" indent="-342900">
               <a:buFont typeface="Arial" panose="020B0604020202020204" pitchFamily="34" charset="0"/>
               <a:buChar char="•"/>
             </a:pPr>
             <a:r>
-              <a:rPr lang="pt-BR" sz="2000" b="1" dirty="0"/>
-              <a:t>Objetivo:</a:t>
-            </a:r>
-            <a:r>
-              <a:rPr lang="pt-BR" sz="2000" dirty="0"/>
-              <a:t> Capacitar o público em Inteligência Artificial (IA) e suas aplicações.</a:t>
-            </a:r>
-          </a:p>
-          <a:p>
-            <a:r>
-              <a:rPr lang="pt-BR" sz="2000" dirty="0"/>
-              <a:t>O site contará com conteúdo interativo, incluindo artigos, vídeos e tutoriais que explicam o que é IA, suas categorias e exemplos práticos, como assistentes virtuais e </a:t>
-            </a:r>
-            <a:r>
-              <a:rPr lang="pt-BR" sz="2000" dirty="0" err="1"/>
-              <a:t>chatbots</a:t>
-            </a:r>
-            <a:r>
-              <a:rPr lang="pt-BR" sz="2000" dirty="0"/>
-              <a:t>. Além disso, oferecerá uma seção com recursos de aprendizado, como guias passo a passo e exercícios práticos para reforçar o conhecimento, além de um fórum para discussão e troca de experiências entre os usuários.</a:t>
-            </a:r>
-            <a:br>
-              <a:rPr lang="pt-BR" sz="2000" dirty="0"/>
-            </a:br>
-            <a:endParaRPr lang="pt-BR" sz="2000" dirty="0"/>
-          </a:p>
-          <a:p>
-            <a:r>
-              <a:rPr lang="pt-BR" sz="2000" b="1" dirty="0"/>
-              <a:t>Benefícios:</a:t>
-            </a:r>
-            <a:endParaRPr lang="pt-BR" sz="2000" dirty="0"/>
-          </a:p>
-          <a:p>
-            <a:pPr>
-              <a:buFont typeface="Arial" panose="020B0604020202020204" pitchFamily="34" charset="0"/>
-              <a:buChar char="•"/>
-            </a:pPr>
-            <a:r>
-              <a:rPr lang="pt-BR" sz="2000" dirty="0"/>
-              <a:t>Aumenta a alfabetização digital.</a:t>
-            </a:r>
-          </a:p>
-          <a:p>
-            <a:pPr>
-              <a:buFont typeface="Arial" panose="020B0604020202020204" pitchFamily="34" charset="0"/>
-              <a:buChar char="•"/>
-            </a:pPr>
-            <a:r>
-              <a:rPr lang="pt-BR" sz="2000" dirty="0"/>
-              <a:t>Prepara a força de trabalho para o futuro.</a:t>
-            </a:r>
-          </a:p>
-          <a:p>
-            <a:pPr>
-              <a:buFont typeface="Arial" panose="020B0604020202020204" pitchFamily="34" charset="0"/>
-              <a:buChar char="•"/>
-            </a:pPr>
-            <a:r>
-              <a:rPr lang="pt-BR" sz="2000" dirty="0"/>
-              <a:t>Fortalece a imagem da empresa como líder em inovação.</a:t>
-            </a:r>
-            <a:br>
-              <a:rPr lang="pt-BR" sz="2000" dirty="0"/>
-            </a:br>
-            <a:endParaRPr lang="pt-BR" sz="2000" dirty="0"/>
-          </a:p>
-          <a:p>
-            <a:r>
-              <a:rPr lang="pt-BR" sz="2000" b="1" dirty="0"/>
-              <a:t>Implementação:</a:t>
-            </a:r>
-            <a:r>
-              <a:rPr lang="pt-BR" sz="2000" dirty="0"/>
-              <a:t> O projeto será lançado em fases, começando pelo desenvolvimento do conteúdo e design, seguido de uma versão beta com feedback contínuo. Campanhas de marketing digital ajudarão a atrair usuários e gerar engajamento.</a:t>
+              <a:rPr lang="pt-BR" sz="2400" dirty="0">
+                <a:solidFill>
+                  <a:srgbClr val="000000"/>
+                </a:solidFill>
+                <a:latin typeface="Arial" panose="020B0604020202020204" pitchFamily="34" charset="0"/>
+              </a:rPr>
+              <a:t>Análise do mercado e tendência tecnológicas;</a:t>
             </a:r>
           </a:p>
           <a:p>
@@ -6581,6 +6750,75 @@
               <a:buFont typeface="Arial" panose="020B0604020202020204" pitchFamily="34" charset="0"/>
               <a:buChar char="•"/>
             </a:pPr>
+            <a:r>
+              <a:rPr lang="pt-BR" sz="2400" dirty="0">
+                <a:solidFill>
+                  <a:srgbClr val="000000"/>
+                </a:solidFill>
+                <a:latin typeface="Arial" panose="020B0604020202020204" pitchFamily="34" charset="0"/>
+              </a:rPr>
+              <a:t>Investimento em inovação com a criação do departamento de P&amp;D;</a:t>
+            </a:r>
+          </a:p>
+          <a:p>
+            <a:pPr marL="342900" indent="-342900">
+              <a:buFont typeface="Arial" panose="020B0604020202020204" pitchFamily="34" charset="0"/>
+              <a:buChar char="•"/>
+            </a:pPr>
+            <a:r>
+              <a:rPr lang="pt-BR" sz="2400" dirty="0">
+                <a:solidFill>
+                  <a:srgbClr val="000000"/>
+                </a:solidFill>
+                <a:latin typeface="Arial" panose="020B0604020202020204" pitchFamily="34" charset="0"/>
+              </a:rPr>
+              <a:t>Capacitação da equipe;</a:t>
+            </a:r>
+          </a:p>
+          <a:p>
+            <a:pPr marL="342900" indent="-342900">
+              <a:buFont typeface="Arial" panose="020B0604020202020204" pitchFamily="34" charset="0"/>
+              <a:buChar char="•"/>
+            </a:pPr>
+            <a:r>
+              <a:rPr lang="pt-BR" sz="2400" dirty="0">
+                <a:solidFill>
+                  <a:srgbClr val="000000"/>
+                </a:solidFill>
+                <a:latin typeface="Arial" panose="020B0604020202020204" pitchFamily="34" charset="0"/>
+              </a:rPr>
+              <a:t>Adaptação do produto e processos;</a:t>
+            </a:r>
+          </a:p>
+          <a:p>
+            <a:pPr marL="342900" indent="-342900">
+              <a:buFont typeface="Arial" panose="020B0604020202020204" pitchFamily="34" charset="0"/>
+              <a:buChar char="•"/>
+            </a:pPr>
+            <a:r>
+              <a:rPr lang="pt-BR" sz="2400" dirty="0">
+                <a:solidFill>
+                  <a:srgbClr val="000000"/>
+                </a:solidFill>
+                <a:latin typeface="Arial" panose="020B0604020202020204" pitchFamily="34" charset="0"/>
+              </a:rPr>
+              <a:t>Estratégia de marketing e reposicionamento;</a:t>
+            </a:r>
+          </a:p>
+          <a:p>
+            <a:pPr marL="342900" indent="-342900">
+              <a:buFont typeface="Arial" panose="020B0604020202020204" pitchFamily="34" charset="0"/>
+              <a:buChar char="•"/>
+            </a:pPr>
+            <a:r>
+              <a:rPr lang="pt-BR" sz="2400" dirty="0">
+                <a:solidFill>
+                  <a:srgbClr val="000000"/>
+                </a:solidFill>
+                <a:latin typeface="Arial" panose="020B0604020202020204" pitchFamily="34" charset="0"/>
+              </a:rPr>
+              <a:t>Plano de implementação gradual e testes de aceitação. </a:t>
+            </a:r>
             <a:endParaRPr lang="pt-BR" sz="2400" dirty="0"/>
           </a:p>
         </p:txBody>
@@ -6588,7 +6826,7 @@
     </p:spTree>
     <p:extLst>
       <p:ext uri="{BB962C8B-B14F-4D97-AF65-F5344CB8AC3E}">
-        <p14:creationId xmlns:p14="http://schemas.microsoft.com/office/powerpoint/2010/main" val="2558535511"/>
+        <p14:creationId xmlns:p14="http://schemas.microsoft.com/office/powerpoint/2010/main" val="3953366487"/>
       </p:ext>
     </p:extLst>
   </p:cSld>
@@ -6652,7 +6890,7 @@
                 <a:latin typeface="Arial" panose="020B0604020202020204" pitchFamily="34" charset="0"/>
                 <a:cs typeface="Arial" panose="020B0604020202020204" pitchFamily="34" charset="0"/>
               </a:rPr>
-              <a:t>Bibliografia</a:t>
+              <a:t>Solução</a:t>
             </a:r>
           </a:p>
         </p:txBody>
@@ -6671,8 +6909,8 @@
         </p:nvSpPr>
         <p:spPr>
           <a:xfrm>
-            <a:off x="-169332" y="-169332"/>
-            <a:ext cx="12479866" cy="530056"/>
+            <a:off x="11463866" y="-169333"/>
+            <a:ext cx="846667" cy="7027333"/>
           </a:xfrm>
           <a:prstGeom prst="rect">
             <a:avLst/>
@@ -6714,61 +6952,6 @@
       </p:sp>
       <p:sp>
         <p:nvSpPr>
-          <p:cNvPr id="9" name="Retângulo 8">
-            <a:extLst>
-              <a:ext uri="{FF2B5EF4-FFF2-40B4-BE49-F238E27FC236}">
-                <a16:creationId xmlns:a16="http://schemas.microsoft.com/office/drawing/2014/main" id="{C684D629-A785-598C-40B8-25FB1CC4DF67}"/>
-              </a:ext>
-            </a:extLst>
-          </p:cNvPr>
-          <p:cNvSpPr/>
-          <p:nvPr/>
-        </p:nvSpPr>
-        <p:spPr>
-          <a:xfrm>
-            <a:off x="12733867" y="5251125"/>
-            <a:ext cx="527117" cy="3674654"/>
-          </a:xfrm>
-          <a:prstGeom prst="rect">
-            <a:avLst/>
-          </a:prstGeom>
-          <a:solidFill>
-            <a:schemeClr val="tx2">
-              <a:lumMod val="75000"/>
-              <a:lumOff val="25000"/>
-            </a:schemeClr>
-          </a:solidFill>
-          <a:ln>
-            <a:noFill/>
-          </a:ln>
-        </p:spPr>
-        <p:style>
-          <a:lnRef idx="2">
-            <a:schemeClr val="accent1">
-              <a:shade val="15000"/>
-            </a:schemeClr>
-          </a:lnRef>
-          <a:fillRef idx="1">
-            <a:schemeClr val="accent1"/>
-          </a:fillRef>
-          <a:effectRef idx="0">
-            <a:schemeClr val="accent1"/>
-          </a:effectRef>
-          <a:fontRef idx="minor">
-            <a:schemeClr val="lt1"/>
-          </a:fontRef>
-        </p:style>
-        <p:txBody>
-          <a:bodyPr rtlCol="0" anchor="ctr"/>
-          <a:lstStyle/>
-          <a:p>
-            <a:pPr algn="ctr"/>
-            <a:endParaRPr lang="pt-BR"/>
-          </a:p>
-        </p:txBody>
-      </p:sp>
-      <p:sp>
-        <p:nvSpPr>
           <p:cNvPr id="3" name="CaixaDeTexto 2">
             <a:extLst>
               <a:ext uri="{FF2B5EF4-FFF2-40B4-BE49-F238E27FC236}">
@@ -6782,7 +6965,7 @@
         <p:spPr>
           <a:xfrm>
             <a:off x="643467" y="1295853"/>
-            <a:ext cx="10397065" cy="5201424"/>
+            <a:ext cx="10397065" cy="5386090"/>
           </a:xfrm>
           <a:prstGeom prst="rect">
             <a:avLst/>
@@ -6796,328 +6979,8 @@
           <a:lstStyle/>
           <a:p>
             <a:r>
-              <a:rPr lang="pt-BR" sz="1400" dirty="0"/>
-              <a:t>SOMOS COOPERATIVISMO. SESCOOP. Disponível em: </a:t>
-            </a:r>
-            <a:r>
-              <a:rPr lang="pt-BR" sz="1400" dirty="0">
-                <a:hlinkClick r:id="rId2"/>
-              </a:rPr>
-              <a:t>https://somoscooperativismo.coop.br/institucional/</a:t>
-            </a:r>
-            <a:r>
-              <a:rPr lang="pt-BR" sz="1400" dirty="0" err="1">
-                <a:hlinkClick r:id="rId2"/>
-              </a:rPr>
-              <a:t>sescoop</a:t>
-            </a:r>
-            <a:r>
-              <a:rPr lang="pt-BR" sz="1400" dirty="0"/>
-              <a:t>. Acesso em: 27 set. 2024.</a:t>
-            </a:r>
-          </a:p>
-          <a:p>
-            <a:r>
-              <a:rPr lang="pt-BR" sz="1400" dirty="0"/>
-              <a:t>FERREIRA, Wilson. </a:t>
-            </a:r>
-            <a:r>
-              <a:rPr lang="pt-BR" sz="1400" dirty="0" err="1"/>
-              <a:t>Sest</a:t>
-            </a:r>
-            <a:r>
-              <a:rPr lang="pt-BR" sz="1400" dirty="0"/>
-              <a:t> Senat: o que é isso? Disponível em: </a:t>
-            </a:r>
-            <a:r>
-              <a:rPr lang="pt-BR" sz="1400" dirty="0">
-                <a:hlinkClick r:id="rId3"/>
-              </a:rPr>
-              <a:t>https://www.linkedin.com/pulse/</a:t>
-            </a:r>
-            <a:r>
-              <a:rPr lang="pt-BR" sz="1400" dirty="0" err="1">
-                <a:hlinkClick r:id="rId3"/>
-              </a:rPr>
-              <a:t>sest</a:t>
-            </a:r>
-            <a:r>
-              <a:rPr lang="pt-BR" sz="1400" dirty="0">
-                <a:hlinkClick r:id="rId3"/>
-              </a:rPr>
-              <a:t>-</a:t>
-            </a:r>
-            <a:r>
-              <a:rPr lang="pt-BR" sz="1400" dirty="0" err="1">
-                <a:hlinkClick r:id="rId3"/>
-              </a:rPr>
-              <a:t>senat</a:t>
-            </a:r>
-            <a:r>
-              <a:rPr lang="pt-BR" sz="1400" dirty="0">
-                <a:hlinkClick r:id="rId3"/>
-              </a:rPr>
-              <a:t>-</a:t>
-            </a:r>
-            <a:r>
-              <a:rPr lang="pt-BR" sz="1400" dirty="0" err="1">
-                <a:hlinkClick r:id="rId3"/>
-              </a:rPr>
-              <a:t>o-que</a:t>
-            </a:r>
-            <a:r>
-              <a:rPr lang="pt-BR" sz="1400" dirty="0">
-                <a:hlinkClick r:id="rId3"/>
-              </a:rPr>
-              <a:t>-%C3%A9-isso-wilson-ferreira/</a:t>
-            </a:r>
-            <a:r>
-              <a:rPr lang="pt-BR" sz="1400" dirty="0"/>
-              <a:t>. Acesso em: 27 set. 2024.</a:t>
-            </a:r>
-          </a:p>
-          <a:p>
-            <a:r>
-              <a:rPr lang="pt-BR" sz="1400" dirty="0"/>
-              <a:t>FETRAM. Conheça o SEST SENAT. Disponível em: </a:t>
-            </a:r>
-            <a:r>
-              <a:rPr lang="pt-BR" sz="1400" dirty="0">
-                <a:hlinkClick r:id="rId4"/>
-              </a:rPr>
-              <a:t>https://fetram.org.br/2020/03/</a:t>
-            </a:r>
-            <a:r>
-              <a:rPr lang="pt-BR" sz="1400" dirty="0" err="1">
-                <a:hlinkClick r:id="rId4"/>
-              </a:rPr>
-              <a:t>conheca</a:t>
-            </a:r>
-            <a:r>
-              <a:rPr lang="pt-BR" sz="1400" dirty="0">
-                <a:hlinkClick r:id="rId4"/>
-              </a:rPr>
-              <a:t>-o-</a:t>
-            </a:r>
-            <a:r>
-              <a:rPr lang="pt-BR" sz="1400" dirty="0" err="1">
-                <a:hlinkClick r:id="rId4"/>
-              </a:rPr>
-              <a:t>sest</a:t>
-            </a:r>
-            <a:r>
-              <a:rPr lang="pt-BR" sz="1400" dirty="0">
-                <a:hlinkClick r:id="rId4"/>
-              </a:rPr>
-              <a:t>-</a:t>
-            </a:r>
-            <a:r>
-              <a:rPr lang="pt-BR" sz="1400" dirty="0" err="1">
-                <a:hlinkClick r:id="rId4"/>
-              </a:rPr>
-              <a:t>senat</a:t>
-            </a:r>
-            <a:r>
-              <a:rPr lang="pt-BR" sz="1400" dirty="0">
-                <a:hlinkClick r:id="rId4"/>
-              </a:rPr>
-              <a:t>/#:~:text=O%20SEST%20SENAT%20(Servi%C3%A7o%20Social,1993%20pela%20lei%20n%C2%BA%208.706</a:t>
-            </a:r>
-            <a:r>
-              <a:rPr lang="pt-BR" sz="1400" dirty="0"/>
-              <a:t>. Acesso em: 27 set. 2024.</a:t>
-            </a:r>
-          </a:p>
-          <a:p>
-            <a:r>
-              <a:rPr lang="pt-BR" sz="1400" dirty="0"/>
-              <a:t>SEST SENAT. Conheça o SEST SENAT. Disponível em: </a:t>
-            </a:r>
-            <a:r>
-              <a:rPr lang="pt-BR" sz="1400" dirty="0">
-                <a:hlinkClick r:id="rId5"/>
-              </a:rPr>
-              <a:t>https://ead.sestsenat.org.br/</a:t>
-            </a:r>
-            <a:r>
-              <a:rPr lang="pt-BR" sz="1400" dirty="0" err="1">
-                <a:hlinkClick r:id="rId5"/>
-              </a:rPr>
-              <a:t>conheca</a:t>
-            </a:r>
-            <a:r>
-              <a:rPr lang="pt-BR" sz="1400" dirty="0">
-                <a:hlinkClick r:id="rId5"/>
-              </a:rPr>
-              <a:t>-o-</a:t>
-            </a:r>
-            <a:r>
-              <a:rPr lang="pt-BR" sz="1400" dirty="0" err="1">
-                <a:hlinkClick r:id="rId5"/>
-              </a:rPr>
-              <a:t>sest</a:t>
-            </a:r>
-            <a:r>
-              <a:rPr lang="pt-BR" sz="1400" dirty="0">
-                <a:hlinkClick r:id="rId5"/>
-              </a:rPr>
-              <a:t>-</a:t>
-            </a:r>
-            <a:r>
-              <a:rPr lang="pt-BR" sz="1400" dirty="0" err="1">
-                <a:hlinkClick r:id="rId5"/>
-              </a:rPr>
-              <a:t>senat</a:t>
-            </a:r>
-            <a:r>
-              <a:rPr lang="pt-BR" sz="1400" dirty="0">
-                <a:hlinkClick r:id="rId5"/>
-              </a:rPr>
-              <a:t>/#:~:text=Prover%20sa%C3%BAde%2C%20qualidade%20de%20vida,longevidade%20das%20pessoas%20e%20empresas</a:t>
-            </a:r>
-            <a:r>
-              <a:rPr lang="pt-BR" sz="1400" dirty="0"/>
-              <a:t>. Acesso em: 27 set. 2024.</a:t>
-            </a:r>
-          </a:p>
-          <a:p>
-            <a:r>
-              <a:rPr lang="pt-BR" sz="1400" dirty="0"/>
-              <a:t>SEST SENAT. Saiba como funciona a contribuição paga ao SEST SENAT. Disponível em: </a:t>
-            </a:r>
-            <a:r>
-              <a:rPr lang="pt-BR" sz="1400" dirty="0">
-                <a:hlinkClick r:id="rId6"/>
-              </a:rPr>
-              <a:t>https://www.sestsenat.org.br/sobre-nos/saiba-como-funciona-a-</a:t>
-            </a:r>
-            <a:r>
-              <a:rPr lang="pt-BR" sz="1400" dirty="0" err="1">
-                <a:hlinkClick r:id="rId6"/>
-              </a:rPr>
-              <a:t>contribuicao</a:t>
-            </a:r>
-            <a:r>
-              <a:rPr lang="pt-BR" sz="1400" dirty="0">
-                <a:hlinkClick r:id="rId6"/>
-              </a:rPr>
-              <a:t>-paga-ao-</a:t>
-            </a:r>
-            <a:r>
-              <a:rPr lang="pt-BR" sz="1400" dirty="0" err="1">
-                <a:hlinkClick r:id="rId6"/>
-              </a:rPr>
-              <a:t>sest</a:t>
-            </a:r>
-            <a:r>
-              <a:rPr lang="pt-BR" sz="1400" dirty="0">
-                <a:hlinkClick r:id="rId6"/>
-              </a:rPr>
-              <a:t>-</a:t>
-            </a:r>
-            <a:r>
-              <a:rPr lang="pt-BR" sz="1400" dirty="0" err="1">
-                <a:hlinkClick r:id="rId6"/>
-              </a:rPr>
-              <a:t>senat</a:t>
-            </a:r>
-            <a:r>
-              <a:rPr lang="pt-BR" sz="1400" dirty="0"/>
-              <a:t>. Acesso em: 27 set. 2024.</a:t>
-            </a:r>
-          </a:p>
-          <a:p>
-            <a:r>
-              <a:rPr lang="pt-BR" sz="1400" dirty="0"/>
-              <a:t>SEBRAE. SESCOOP: o sistema S dentro do cooperativismo. Disponível em: </a:t>
-            </a:r>
-            <a:r>
-              <a:rPr lang="pt-BR" sz="1400" dirty="0">
-                <a:hlinkClick r:id="rId7"/>
-              </a:rPr>
-              <a:t>https://sebrae.com.br/sites/</a:t>
-            </a:r>
-            <a:r>
-              <a:rPr lang="pt-BR" sz="1400" dirty="0" err="1">
-                <a:hlinkClick r:id="rId7"/>
-              </a:rPr>
-              <a:t>PortalSebrae</a:t>
-            </a:r>
-            <a:r>
-              <a:rPr lang="pt-BR" sz="1400" dirty="0">
-                <a:hlinkClick r:id="rId7"/>
-              </a:rPr>
-              <a:t>/artigos/sescoop-o-sistema-s-dentro-do-cooperativismo,20af9855c83a2810VgnVCM100000d701210aRCRD#:~:</a:t>
-            </a:r>
-            <a:r>
-              <a:rPr lang="pt-BR" sz="1400" dirty="0" err="1">
-                <a:hlinkClick r:id="rId7"/>
-              </a:rPr>
-              <a:t>text</a:t>
-            </a:r>
-            <a:r>
-              <a:rPr lang="pt-BR" sz="1400" dirty="0">
-                <a:hlinkClick r:id="rId7"/>
-              </a:rPr>
-              <a:t>=O%20Sescoop%20Nacional%20%C3%A9%20um,7%20de%20abril%20de%201999</a:t>
-            </a:r>
-            <a:r>
-              <a:rPr lang="pt-BR" sz="1400" dirty="0"/>
-              <a:t>. Acesso em: 27 set. 2024.</a:t>
-            </a:r>
-          </a:p>
-          <a:p>
-            <a:r>
-              <a:rPr lang="pt-BR" sz="1400" dirty="0"/>
-              <a:t>SOMOS COOPERATIVISMO. SESCOOP. Disponível em: https://somoscooperativismo.coop.br/institucional/</a:t>
-            </a:r>
-            <a:r>
-              <a:rPr lang="pt-BR" sz="1400" dirty="0" err="1"/>
-              <a:t>sescoop</a:t>
-            </a:r>
-            <a:r>
-              <a:rPr lang="pt-BR" sz="1400" dirty="0"/>
-              <a:t>#:~:text=Garantir%20o%20fortalecimento%20do%20seu,gest%C3%A3o%20para%20o%20desenvolvimento%20das. Acesso em: 27 set. 2024.</a:t>
-            </a:r>
-          </a:p>
-          <a:p>
-            <a:r>
-              <a:rPr lang="pt-BR" sz="1400" dirty="0"/>
-              <a:t>FETRANSPAR. SEST SENAT: histórico. Disponível em: </a:t>
-            </a:r>
-            <a:r>
-              <a:rPr lang="pt-BR" sz="1400" dirty="0">
-                <a:hlinkClick r:id="rId8"/>
-              </a:rPr>
-              <a:t>https://www.fetranspar.org.br/</a:t>
-            </a:r>
-            <a:r>
-              <a:rPr lang="pt-BR" sz="1400" dirty="0" err="1">
-                <a:hlinkClick r:id="rId8"/>
-              </a:rPr>
-              <a:t>sest-senat</a:t>
-            </a:r>
-            <a:r>
-              <a:rPr lang="pt-BR" sz="1400" dirty="0">
-                <a:hlinkClick r:id="rId8"/>
-              </a:rPr>
-              <a:t>/</a:t>
-            </a:r>
-            <a:r>
-              <a:rPr lang="pt-BR" sz="1400" dirty="0" err="1">
-                <a:hlinkClick r:id="rId8"/>
-              </a:rPr>
-              <a:t>historico</a:t>
-            </a:r>
-            <a:r>
-              <a:rPr lang="pt-BR" sz="1400" dirty="0">
-                <a:hlinkClick r:id="rId8"/>
-              </a:rPr>
-              <a:t>/#:~:text=Elas%20foram%20criadas%20em%2014,%C3%A0s%20complexas%20formas%20de%20trabalho</a:t>
-            </a:r>
-            <a:r>
-              <a:rPr lang="pt-BR" sz="1400" dirty="0"/>
-              <a:t>. Acesso em: 27 set. 2024.</a:t>
+              <a:rPr lang="pt-BR" sz="2000" b="1" dirty="0"/>
+              <a:t>Criação de um Site Educacional sobre Inteligência Artificial</a:t>
             </a:r>
           </a:p>
           <a:p>
@@ -7125,104 +6988,106 @@
               <a:buFont typeface="Arial" panose="020B0604020202020204" pitchFamily="34" charset="0"/>
               <a:buChar char="•"/>
             </a:pPr>
+            <a:r>
+              <a:rPr lang="pt-BR" sz="2000" b="1" dirty="0"/>
+              <a:t>Objetivo:</a:t>
+            </a:r>
+            <a:r>
+              <a:rPr lang="pt-BR" sz="2000" dirty="0"/>
+              <a:t> Capacitar o público em Inteligência Artificial (IA) e suas aplicações.</a:t>
+            </a:r>
+          </a:p>
+          <a:p>
+            <a:r>
+              <a:rPr lang="pt-BR" sz="2000" dirty="0"/>
+              <a:t>O site contará com conteúdo interativo, incluindo artigos, vídeos e tutoriais que explicam o que é IA, suas categorias e exemplos práticos, como assistentes virtuais e </a:t>
+            </a:r>
+            <a:r>
+              <a:rPr lang="pt-BR" sz="2000" dirty="0" err="1"/>
+              <a:t>chatbots</a:t>
+            </a:r>
+            <a:r>
+              <a:rPr lang="pt-BR" sz="2000" dirty="0"/>
+              <a:t>. Além disso, oferecerá uma seção com recursos de aprendizado, como guias passo a passo e exercícios práticos para reforçar o conhecimento, além de um fórum para discussão e troca de experiências entre os usuários.</a:t>
+            </a:r>
+            <a:br>
+              <a:rPr lang="pt-BR" sz="2000" dirty="0"/>
+            </a:br>
+            <a:endParaRPr lang="pt-BR" sz="2000" dirty="0"/>
+          </a:p>
+          <a:p>
+            <a:r>
+              <a:rPr lang="pt-BR" sz="2000" b="1" dirty="0"/>
+              <a:t>Benefícios:</a:t>
+            </a:r>
+            <a:endParaRPr lang="pt-BR" sz="2000" dirty="0"/>
+          </a:p>
+          <a:p>
+            <a:pPr>
+              <a:buFont typeface="Arial" panose="020B0604020202020204" pitchFamily="34" charset="0"/>
+              <a:buChar char="•"/>
+            </a:pPr>
+            <a:r>
+              <a:rPr lang="pt-BR" sz="2000" dirty="0"/>
+              <a:t>Aumenta a alfabetização digital.</a:t>
+            </a:r>
+          </a:p>
+          <a:p>
+            <a:pPr>
+              <a:buFont typeface="Arial" panose="020B0604020202020204" pitchFamily="34" charset="0"/>
+              <a:buChar char="•"/>
+            </a:pPr>
+            <a:r>
+              <a:rPr lang="pt-BR" sz="2000" dirty="0"/>
+              <a:t>Prepara a força de trabalho para o futuro.</a:t>
+            </a:r>
+          </a:p>
+          <a:p>
+            <a:pPr>
+              <a:buFont typeface="Arial" panose="020B0604020202020204" pitchFamily="34" charset="0"/>
+              <a:buChar char="•"/>
+            </a:pPr>
+            <a:r>
+              <a:rPr lang="pt-BR" sz="2000" dirty="0"/>
+              <a:t>Fortalece a imagem da empresa como líder em inovação.</a:t>
+            </a:r>
+            <a:br>
+              <a:rPr lang="pt-BR" sz="2000" dirty="0"/>
+            </a:br>
+            <a:endParaRPr lang="pt-BR" sz="2000" dirty="0"/>
+          </a:p>
+          <a:p>
+            <a:r>
+              <a:rPr lang="pt-BR" sz="2000" b="1" dirty="0"/>
+              <a:t>Implementação:</a:t>
+            </a:r>
+            <a:r>
+              <a:rPr lang="pt-BR" sz="2000" dirty="0"/>
+              <a:t> O projeto será lançado em fases, começando pelo desenvolvimento do conteúdo e design, seguido de uma versão beta com feedback contínuo. Campanhas de marketing digital ajudarão a atrair usuários e gerar engajamento.</a:t>
+            </a:r>
+          </a:p>
+          <a:p>
+            <a:pPr marL="342900" indent="-342900">
+              <a:buFont typeface="Arial" panose="020B0604020202020204" pitchFamily="34" charset="0"/>
+              <a:buChar char="•"/>
+            </a:pPr>
             <a:endParaRPr lang="pt-BR" sz="2400" dirty="0"/>
           </a:p>
         </p:txBody>
       </p:sp>
-      <p:pic>
-        <p:nvPicPr>
-          <p:cNvPr id="6" name="Imagem 5" descr="Desenho preto e branco&#10;&#10;Descrição gerada automaticamente com confiança média">
-            <a:extLst>
-              <a:ext uri="{FF2B5EF4-FFF2-40B4-BE49-F238E27FC236}">
-                <a16:creationId xmlns:a16="http://schemas.microsoft.com/office/drawing/2014/main" id="{B9B1CCA4-278E-49BD-2327-FC739DA9524C}"/>
-              </a:ext>
-            </a:extLst>
-          </p:cNvPr>
-          <p:cNvPicPr>
-            <a:picLocks noChangeAspect="1"/>
-          </p:cNvPicPr>
-          <p:nvPr/>
-        </p:nvPicPr>
-        <p:blipFill>
-          <a:blip r:embed="rId9">
-            <a:extLst>
-              <a:ext uri="{28A0092B-C50C-407E-A947-70E740481C1C}">
-                <a14:useLocalDpi xmlns:a14="http://schemas.microsoft.com/office/drawing/2010/main" val="0"/>
-              </a:ext>
-            </a:extLst>
-          </a:blip>
-          <a:stretch>
-            <a:fillRect/>
-          </a:stretch>
-        </p:blipFill>
-        <p:spPr>
-          <a:xfrm>
-            <a:off x="9965266" y="4588934"/>
-            <a:ext cx="6858000" cy="6858000"/>
-          </a:xfrm>
-          <a:prstGeom prst="rect">
-            <a:avLst/>
-          </a:prstGeom>
-        </p:spPr>
-      </p:pic>
-      <p:pic>
-        <p:nvPicPr>
-          <p:cNvPr id="7" name="Imagem 6" descr="Desenho preto e branco&#10;&#10;Descrição gerada automaticamente com confiança média">
-            <a:extLst>
-              <a:ext uri="{FF2B5EF4-FFF2-40B4-BE49-F238E27FC236}">
-                <a16:creationId xmlns:a16="http://schemas.microsoft.com/office/drawing/2014/main" id="{F5E06998-5B52-697C-D1E2-BEFD4A9266F1}"/>
-              </a:ext>
-            </a:extLst>
-          </p:cNvPr>
-          <p:cNvPicPr>
-            <a:picLocks noChangeAspect="1"/>
-          </p:cNvPicPr>
-          <p:nvPr/>
-        </p:nvPicPr>
-        <p:blipFill>
-          <a:blip r:embed="rId9">
-            <a:extLst>
-              <a:ext uri="{28A0092B-C50C-407E-A947-70E740481C1C}">
-                <a14:useLocalDpi xmlns:a14="http://schemas.microsoft.com/office/drawing/2010/main" val="0"/>
-              </a:ext>
-            </a:extLst>
-          </a:blip>
-          <a:stretch>
-            <a:fillRect/>
-          </a:stretch>
-        </p:blipFill>
-        <p:spPr>
-          <a:xfrm>
-            <a:off x="-5410199" y="-4592277"/>
-            <a:ext cx="6858000" cy="6858000"/>
-          </a:xfrm>
-          <a:prstGeom prst="rect">
-            <a:avLst/>
-          </a:prstGeom>
-        </p:spPr>
-      </p:pic>
     </p:spTree>
     <p:extLst>
       <p:ext uri="{BB962C8B-B14F-4D97-AF65-F5344CB8AC3E}">
-        <p14:creationId xmlns:p14="http://schemas.microsoft.com/office/powerpoint/2010/main" val="911402759"/>
+        <p14:creationId xmlns:p14="http://schemas.microsoft.com/office/powerpoint/2010/main" val="2558535511"/>
       </p:ext>
     </p:extLst>
   </p:cSld>
   <p:clrMapOvr>
     <a:masterClrMapping/>
   </p:clrMapOvr>
-  <mc:AlternateContent xmlns:mc="http://schemas.openxmlformats.org/markup-compatibility/2006">
-    <mc:Choice xmlns:p159="http://schemas.microsoft.com/office/powerpoint/2015/09/main" Requires="p159">
-      <p:transition xmlns:p14="http://schemas.microsoft.com/office/powerpoint/2010/main" spd="slow" p14:dur="2000">
-        <p159:morph option="byObject"/>
-      </p:transition>
-    </mc:Choice>
-    <mc:Fallback>
-      <p:transition spd="slow">
-        <p:fade/>
-      </p:transition>
-    </mc:Fallback>
-  </mc:AlternateContent>
+  <p:transition spd="slow">
+    <p:push dir="u"/>
+  </p:transition>
 </p:sld>
 </file>
 
@@ -7261,7 +7126,7 @@
         </p:nvSpPr>
         <p:spPr>
           <a:xfrm>
-            <a:off x="1524000" y="3016121"/>
+            <a:off x="643467" y="470096"/>
             <a:ext cx="9144000" cy="825757"/>
           </a:xfrm>
         </p:spPr>
@@ -7271,12 +7136,13 @@
           </a:bodyPr>
           <a:lstStyle/>
           <a:p>
+            <a:pPr algn="l"/>
             <a:r>
               <a:rPr lang="pt-BR" sz="4000" dirty="0">
                 <a:latin typeface="Arial" panose="020B0604020202020204" pitchFamily="34" charset="0"/>
                 <a:cs typeface="Arial" panose="020B0604020202020204" pitchFamily="34" charset="0"/>
               </a:rPr>
-              <a:t>Obrigada</a:t>
+              <a:t>Bibliografia</a:t>
             </a:r>
           </a:p>
         </p:txBody>
@@ -7295,7 +7161,7 @@
         </p:nvSpPr>
         <p:spPr>
           <a:xfrm>
-            <a:off x="-143933" y="-737866"/>
+            <a:off x="-169332" y="-169332"/>
             <a:ext cx="12479866" cy="530056"/>
           </a:xfrm>
           <a:prstGeom prst="rect">
@@ -7391,6 +7257,368 @@
           </a:p>
         </p:txBody>
       </p:sp>
+      <p:sp>
+        <p:nvSpPr>
+          <p:cNvPr id="3" name="CaixaDeTexto 2">
+            <a:extLst>
+              <a:ext uri="{FF2B5EF4-FFF2-40B4-BE49-F238E27FC236}">
+                <a16:creationId xmlns:a16="http://schemas.microsoft.com/office/drawing/2014/main" id="{ADA10E72-79B3-7FD6-3C20-5B04E02E1741}"/>
+              </a:ext>
+            </a:extLst>
+          </p:cNvPr>
+          <p:cNvSpPr txBox="1"/>
+          <p:nvPr/>
+        </p:nvSpPr>
+        <p:spPr>
+          <a:xfrm>
+            <a:off x="643467" y="1295853"/>
+            <a:ext cx="10397065" cy="5201424"/>
+          </a:xfrm>
+          <a:prstGeom prst="rect">
+            <a:avLst/>
+          </a:prstGeom>
+          <a:noFill/>
+        </p:spPr>
+        <p:txBody>
+          <a:bodyPr wrap="square" rtlCol="0">
+            <a:spAutoFit/>
+          </a:bodyPr>
+          <a:lstStyle/>
+          <a:p>
+            <a:r>
+              <a:rPr lang="pt-BR" sz="1400" dirty="0"/>
+              <a:t>SOMOS COOPERATIVISMO. SESCOOP. Disponível em: </a:t>
+            </a:r>
+            <a:r>
+              <a:rPr lang="pt-BR" sz="1400" dirty="0">
+                <a:hlinkClick r:id="rId2"/>
+              </a:rPr>
+              <a:t>https://somoscooperativismo.coop.br/institucional/</a:t>
+            </a:r>
+            <a:r>
+              <a:rPr lang="pt-BR" sz="1400" dirty="0" err="1">
+                <a:hlinkClick r:id="rId2"/>
+              </a:rPr>
+              <a:t>sescoop</a:t>
+            </a:r>
+            <a:r>
+              <a:rPr lang="pt-BR" sz="1400" dirty="0"/>
+              <a:t>. Acesso em: 27 set. 2024.</a:t>
+            </a:r>
+          </a:p>
+          <a:p>
+            <a:r>
+              <a:rPr lang="pt-BR" sz="1400" dirty="0"/>
+              <a:t>FERREIRA, Wilson. </a:t>
+            </a:r>
+            <a:r>
+              <a:rPr lang="pt-BR" sz="1400" dirty="0" err="1"/>
+              <a:t>Sest</a:t>
+            </a:r>
+            <a:r>
+              <a:rPr lang="pt-BR" sz="1400" dirty="0"/>
+              <a:t> Senat: o que é isso? Disponível em: </a:t>
+            </a:r>
+            <a:r>
+              <a:rPr lang="pt-BR" sz="1400" dirty="0">
+                <a:hlinkClick r:id="rId3"/>
+              </a:rPr>
+              <a:t>https://www.linkedin.com/pulse/</a:t>
+            </a:r>
+            <a:r>
+              <a:rPr lang="pt-BR" sz="1400" dirty="0" err="1">
+                <a:hlinkClick r:id="rId3"/>
+              </a:rPr>
+              <a:t>sest</a:t>
+            </a:r>
+            <a:r>
+              <a:rPr lang="pt-BR" sz="1400" dirty="0">
+                <a:hlinkClick r:id="rId3"/>
+              </a:rPr>
+              <a:t>-</a:t>
+            </a:r>
+            <a:r>
+              <a:rPr lang="pt-BR" sz="1400" dirty="0" err="1">
+                <a:hlinkClick r:id="rId3"/>
+              </a:rPr>
+              <a:t>senat</a:t>
+            </a:r>
+            <a:r>
+              <a:rPr lang="pt-BR" sz="1400" dirty="0">
+                <a:hlinkClick r:id="rId3"/>
+              </a:rPr>
+              <a:t>-</a:t>
+            </a:r>
+            <a:r>
+              <a:rPr lang="pt-BR" sz="1400" dirty="0" err="1">
+                <a:hlinkClick r:id="rId3"/>
+              </a:rPr>
+              <a:t>o-que</a:t>
+            </a:r>
+            <a:r>
+              <a:rPr lang="pt-BR" sz="1400" dirty="0">
+                <a:hlinkClick r:id="rId3"/>
+              </a:rPr>
+              <a:t>-%C3%A9-isso-wilson-ferreira/</a:t>
+            </a:r>
+            <a:r>
+              <a:rPr lang="pt-BR" sz="1400" dirty="0"/>
+              <a:t>. Acesso em: 27 set. 2024.</a:t>
+            </a:r>
+          </a:p>
+          <a:p>
+            <a:r>
+              <a:rPr lang="pt-BR" sz="1400" dirty="0"/>
+              <a:t>FETRAM. Conheça o SEST SENAT. Disponível em: </a:t>
+            </a:r>
+            <a:r>
+              <a:rPr lang="pt-BR" sz="1400" dirty="0">
+                <a:hlinkClick r:id="rId4"/>
+              </a:rPr>
+              <a:t>https://fetram.org.br/2020/03/</a:t>
+            </a:r>
+            <a:r>
+              <a:rPr lang="pt-BR" sz="1400" dirty="0" err="1">
+                <a:hlinkClick r:id="rId4"/>
+              </a:rPr>
+              <a:t>conheca</a:t>
+            </a:r>
+            <a:r>
+              <a:rPr lang="pt-BR" sz="1400" dirty="0">
+                <a:hlinkClick r:id="rId4"/>
+              </a:rPr>
+              <a:t>-o-</a:t>
+            </a:r>
+            <a:r>
+              <a:rPr lang="pt-BR" sz="1400" dirty="0" err="1">
+                <a:hlinkClick r:id="rId4"/>
+              </a:rPr>
+              <a:t>sest</a:t>
+            </a:r>
+            <a:r>
+              <a:rPr lang="pt-BR" sz="1400" dirty="0">
+                <a:hlinkClick r:id="rId4"/>
+              </a:rPr>
+              <a:t>-</a:t>
+            </a:r>
+            <a:r>
+              <a:rPr lang="pt-BR" sz="1400" dirty="0" err="1">
+                <a:hlinkClick r:id="rId4"/>
+              </a:rPr>
+              <a:t>senat</a:t>
+            </a:r>
+            <a:r>
+              <a:rPr lang="pt-BR" sz="1400" dirty="0">
+                <a:hlinkClick r:id="rId4"/>
+              </a:rPr>
+              <a:t>/#:~:text=O%20SEST%20SENAT%20(Servi%C3%A7o%20Social,1993%20pela%20lei%20n%C2%BA%208.706</a:t>
+            </a:r>
+            <a:r>
+              <a:rPr lang="pt-BR" sz="1400" dirty="0"/>
+              <a:t>. Acesso em: 27 set. 2024.</a:t>
+            </a:r>
+          </a:p>
+          <a:p>
+            <a:r>
+              <a:rPr lang="pt-BR" sz="1400" dirty="0"/>
+              <a:t>SEST SENAT. Conheça o SEST SENAT. Disponível em: </a:t>
+            </a:r>
+            <a:r>
+              <a:rPr lang="pt-BR" sz="1400" dirty="0">
+                <a:hlinkClick r:id="rId5"/>
+              </a:rPr>
+              <a:t>https://ead.sestsenat.org.br/</a:t>
+            </a:r>
+            <a:r>
+              <a:rPr lang="pt-BR" sz="1400" dirty="0" err="1">
+                <a:hlinkClick r:id="rId5"/>
+              </a:rPr>
+              <a:t>conheca</a:t>
+            </a:r>
+            <a:r>
+              <a:rPr lang="pt-BR" sz="1400" dirty="0">
+                <a:hlinkClick r:id="rId5"/>
+              </a:rPr>
+              <a:t>-o-</a:t>
+            </a:r>
+            <a:r>
+              <a:rPr lang="pt-BR" sz="1400" dirty="0" err="1">
+                <a:hlinkClick r:id="rId5"/>
+              </a:rPr>
+              <a:t>sest</a:t>
+            </a:r>
+            <a:r>
+              <a:rPr lang="pt-BR" sz="1400" dirty="0">
+                <a:hlinkClick r:id="rId5"/>
+              </a:rPr>
+              <a:t>-</a:t>
+            </a:r>
+            <a:r>
+              <a:rPr lang="pt-BR" sz="1400" dirty="0" err="1">
+                <a:hlinkClick r:id="rId5"/>
+              </a:rPr>
+              <a:t>senat</a:t>
+            </a:r>
+            <a:r>
+              <a:rPr lang="pt-BR" sz="1400" dirty="0">
+                <a:hlinkClick r:id="rId5"/>
+              </a:rPr>
+              <a:t>/#:~:text=Prover%20sa%C3%BAde%2C%20qualidade%20de%20vida,longevidade%20das%20pessoas%20e%20empresas</a:t>
+            </a:r>
+            <a:r>
+              <a:rPr lang="pt-BR" sz="1400" dirty="0"/>
+              <a:t>. Acesso em: 27 set. 2024.</a:t>
+            </a:r>
+          </a:p>
+          <a:p>
+            <a:r>
+              <a:rPr lang="pt-BR" sz="1400" dirty="0"/>
+              <a:t>SEST SENAT. Saiba como funciona a contribuição paga ao SEST SENAT. Disponível em: </a:t>
+            </a:r>
+            <a:r>
+              <a:rPr lang="pt-BR" sz="1400" dirty="0">
+                <a:hlinkClick r:id="rId6"/>
+              </a:rPr>
+              <a:t>https://www.sestsenat.org.br/sobre-nos/saiba-como-funciona-a-</a:t>
+            </a:r>
+            <a:r>
+              <a:rPr lang="pt-BR" sz="1400" dirty="0" err="1">
+                <a:hlinkClick r:id="rId6"/>
+              </a:rPr>
+              <a:t>contribuicao</a:t>
+            </a:r>
+            <a:r>
+              <a:rPr lang="pt-BR" sz="1400" dirty="0">
+                <a:hlinkClick r:id="rId6"/>
+              </a:rPr>
+              <a:t>-paga-ao-</a:t>
+            </a:r>
+            <a:r>
+              <a:rPr lang="pt-BR" sz="1400" dirty="0" err="1">
+                <a:hlinkClick r:id="rId6"/>
+              </a:rPr>
+              <a:t>sest</a:t>
+            </a:r>
+            <a:r>
+              <a:rPr lang="pt-BR" sz="1400" dirty="0">
+                <a:hlinkClick r:id="rId6"/>
+              </a:rPr>
+              <a:t>-</a:t>
+            </a:r>
+            <a:r>
+              <a:rPr lang="pt-BR" sz="1400" dirty="0" err="1">
+                <a:hlinkClick r:id="rId6"/>
+              </a:rPr>
+              <a:t>senat</a:t>
+            </a:r>
+            <a:r>
+              <a:rPr lang="pt-BR" sz="1400" dirty="0"/>
+              <a:t>. Acesso em: 27 set. 2024.</a:t>
+            </a:r>
+          </a:p>
+          <a:p>
+            <a:r>
+              <a:rPr lang="pt-BR" sz="1400" dirty="0"/>
+              <a:t>SEBRAE. SESCOOP: o sistema S dentro do cooperativismo. Disponível em: </a:t>
+            </a:r>
+            <a:r>
+              <a:rPr lang="pt-BR" sz="1400" dirty="0">
+                <a:hlinkClick r:id="rId7"/>
+              </a:rPr>
+              <a:t>https://sebrae.com.br/sites/</a:t>
+            </a:r>
+            <a:r>
+              <a:rPr lang="pt-BR" sz="1400" dirty="0" err="1">
+                <a:hlinkClick r:id="rId7"/>
+              </a:rPr>
+              <a:t>PortalSebrae</a:t>
+            </a:r>
+            <a:r>
+              <a:rPr lang="pt-BR" sz="1400" dirty="0">
+                <a:hlinkClick r:id="rId7"/>
+              </a:rPr>
+              <a:t>/artigos/sescoop-o-sistema-s-dentro-do-cooperativismo,20af9855c83a2810VgnVCM100000d701210aRCRD#:~:</a:t>
+            </a:r>
+            <a:r>
+              <a:rPr lang="pt-BR" sz="1400" dirty="0" err="1">
+                <a:hlinkClick r:id="rId7"/>
+              </a:rPr>
+              <a:t>text</a:t>
+            </a:r>
+            <a:r>
+              <a:rPr lang="pt-BR" sz="1400" dirty="0">
+                <a:hlinkClick r:id="rId7"/>
+              </a:rPr>
+              <a:t>=O%20Sescoop%20Nacional%20%C3%A9%20um,7%20de%20abril%20de%201999</a:t>
+            </a:r>
+            <a:r>
+              <a:rPr lang="pt-BR" sz="1400" dirty="0"/>
+              <a:t>. Acesso em: 27 set. 2024.</a:t>
+            </a:r>
+          </a:p>
+          <a:p>
+            <a:r>
+              <a:rPr lang="pt-BR" sz="1400" dirty="0"/>
+              <a:t>SOMOS COOPERATIVISMO. SESCOOP. Disponível em: https://somoscooperativismo.coop.br/institucional/</a:t>
+            </a:r>
+            <a:r>
+              <a:rPr lang="pt-BR" sz="1400" dirty="0" err="1"/>
+              <a:t>sescoop</a:t>
+            </a:r>
+            <a:r>
+              <a:rPr lang="pt-BR" sz="1400" dirty="0"/>
+              <a:t>#:~:text=Garantir%20o%20fortalecimento%20do%20seu,gest%C3%A3o%20para%20o%20desenvolvimento%20das. Acesso em: 27 set. 2024.</a:t>
+            </a:r>
+          </a:p>
+          <a:p>
+            <a:r>
+              <a:rPr lang="pt-BR" sz="1400" dirty="0"/>
+              <a:t>FETRANSPAR. SEST SENAT: histórico. Disponível em: </a:t>
+            </a:r>
+            <a:r>
+              <a:rPr lang="pt-BR" sz="1400" dirty="0">
+                <a:hlinkClick r:id="rId8"/>
+              </a:rPr>
+              <a:t>https://www.fetranspar.org.br/</a:t>
+            </a:r>
+            <a:r>
+              <a:rPr lang="pt-BR" sz="1400" dirty="0" err="1">
+                <a:hlinkClick r:id="rId8"/>
+              </a:rPr>
+              <a:t>sest-senat</a:t>
+            </a:r>
+            <a:r>
+              <a:rPr lang="pt-BR" sz="1400" dirty="0">
+                <a:hlinkClick r:id="rId8"/>
+              </a:rPr>
+              <a:t>/</a:t>
+            </a:r>
+            <a:r>
+              <a:rPr lang="pt-BR" sz="1400" dirty="0" err="1">
+                <a:hlinkClick r:id="rId8"/>
+              </a:rPr>
+              <a:t>historico</a:t>
+            </a:r>
+            <a:r>
+              <a:rPr lang="pt-BR" sz="1400" dirty="0">
+                <a:hlinkClick r:id="rId8"/>
+              </a:rPr>
+              <a:t>/#:~:text=Elas%20foram%20criadas%20em%2014,%C3%A0s%20complexas%20formas%20de%20trabalho</a:t>
+            </a:r>
+            <a:r>
+              <a:rPr lang="pt-BR" sz="1400" dirty="0"/>
+              <a:t>. Acesso em: 27 set. 2024.</a:t>
+            </a:r>
+          </a:p>
+          <a:p>
+            <a:pPr marL="342900" indent="-342900">
+              <a:buFont typeface="Arial" panose="020B0604020202020204" pitchFamily="34" charset="0"/>
+              <a:buChar char="•"/>
+            </a:pPr>
+            <a:endParaRPr lang="pt-BR" sz="2400" dirty="0"/>
+          </a:p>
+        </p:txBody>
+      </p:sp>
       <p:pic>
         <p:nvPicPr>
           <p:cNvPr id="6" name="Imagem 5" descr="Desenho preto e branco&#10;&#10;Descrição gerada automaticamente com confiança média">
@@ -7406,7 +7634,7 @@
           <p:nvPr/>
         </p:nvPicPr>
         <p:blipFill>
-          <a:blip r:embed="rId2">
+          <a:blip r:embed="rId9">
             <a:extLst>
               <a:ext uri="{28A0092B-C50C-407E-A947-70E740481C1C}">
                 <a14:useLocalDpi xmlns:a14="http://schemas.microsoft.com/office/drawing/2010/main" val="0"/>
@@ -7419,7 +7647,7 @@
         </p:blipFill>
         <p:spPr>
           <a:xfrm>
-            <a:off x="7628466" y="2616200"/>
+            <a:off x="9965266" y="4588934"/>
             <a:ext cx="6858000" cy="6858000"/>
           </a:xfrm>
           <a:prstGeom prst="rect">
@@ -7442,7 +7670,7 @@
           <p:nvPr/>
         </p:nvPicPr>
         <p:blipFill>
-          <a:blip r:embed="rId2">
+          <a:blip r:embed="rId9">
             <a:extLst>
               <a:ext uri="{28A0092B-C50C-407E-A947-70E740481C1C}">
                 <a14:useLocalDpi xmlns:a14="http://schemas.microsoft.com/office/drawing/2010/main" val="0"/>
@@ -7455,7 +7683,7 @@
         </p:blipFill>
         <p:spPr>
           <a:xfrm>
-            <a:off x="-2281767" y="-2441744"/>
+            <a:off x="-5410199" y="-4592277"/>
             <a:ext cx="6858000" cy="6858000"/>
           </a:xfrm>
           <a:prstGeom prst="rect">
@@ -7466,20 +7694,20 @@
     </p:spTree>
     <p:extLst>
       <p:ext uri="{BB962C8B-B14F-4D97-AF65-F5344CB8AC3E}">
-        <p14:creationId xmlns:p14="http://schemas.microsoft.com/office/powerpoint/2010/main" val="2128270260"/>
+        <p14:creationId xmlns:p14="http://schemas.microsoft.com/office/powerpoint/2010/main" val="911402759"/>
       </p:ext>
     </p:extLst>
   </p:cSld>
   <p:clrMapOvr>
     <a:masterClrMapping/>
   </p:clrMapOvr>
-  <mc:AlternateContent xmlns:mc="http://schemas.openxmlformats.org/markup-compatibility/2006">
-    <mc:Choice xmlns:p159="http://schemas.microsoft.com/office/powerpoint/2015/09/main" Requires="p159">
+  <mc:AlternateContent xmlns:mc="http://schemas.openxmlformats.org/markup-compatibility/2006" xmlns:p159="http://schemas.microsoft.com/office/powerpoint/2015/09/main">
+    <mc:Choice Requires="p159">
       <p:transition xmlns:p14="http://schemas.microsoft.com/office/powerpoint/2010/main" spd="slow" p14:dur="2000">
         <p159:morph option="byObject"/>
       </p:transition>
     </mc:Choice>
-    <mc:Fallback>
+    <mc:Fallback xmlns="">
       <p:transition spd="slow">
         <p:fade/>
       </p:transition>
@@ -7912,6 +8140,268 @@
     <p:extLst>
       <p:ext uri="{BB962C8B-B14F-4D97-AF65-F5344CB8AC3E}">
         <p14:creationId xmlns:p14="http://schemas.microsoft.com/office/powerpoint/2010/main" val="299546568"/>
+      </p:ext>
+    </p:extLst>
+  </p:cSld>
+  <p:clrMapOvr>
+    <a:masterClrMapping/>
+  </p:clrMapOvr>
+  <mc:AlternateContent xmlns:mc="http://schemas.openxmlformats.org/markup-compatibility/2006" xmlns:p159="http://schemas.microsoft.com/office/powerpoint/2015/09/main">
+    <mc:Choice Requires="p159">
+      <p:transition xmlns:p14="http://schemas.microsoft.com/office/powerpoint/2010/main" spd="slow" p14:dur="2000">
+        <p159:morph option="byObject"/>
+      </p:transition>
+    </mc:Choice>
+    <mc:Fallback xmlns="">
+      <p:transition spd="slow">
+        <p:fade/>
+      </p:transition>
+    </mc:Fallback>
+  </mc:AlternateContent>
+</p:sld>
+</file>
+
+<file path=ppt/slides/slide20.xml><?xml version="1.0" encoding="utf-8"?>
+<p:sld xmlns:a="http://schemas.openxmlformats.org/drawingml/2006/main" xmlns:r="http://schemas.openxmlformats.org/officeDocument/2006/relationships" xmlns:p="http://schemas.openxmlformats.org/presentationml/2006/main">
+  <p:cSld>
+    <p:spTree>
+      <p:nvGrpSpPr>
+        <p:cNvPr id="1" name=""/>
+        <p:cNvGrpSpPr/>
+        <p:nvPr/>
+      </p:nvGrpSpPr>
+      <p:grpSpPr>
+        <a:xfrm>
+          <a:off x="0" y="0"/>
+          <a:ext cx="0" cy="0"/>
+          <a:chOff x="0" y="0"/>
+          <a:chExt cx="0" cy="0"/>
+        </a:xfrm>
+      </p:grpSpPr>
+      <p:sp>
+        <p:nvSpPr>
+          <p:cNvPr id="2" name="Título 1">
+            <a:extLst>
+              <a:ext uri="{FF2B5EF4-FFF2-40B4-BE49-F238E27FC236}">
+                <a16:creationId xmlns:a16="http://schemas.microsoft.com/office/drawing/2014/main" id="{6DB6832F-1F40-FEBB-11B9-3EC3E276D3D3}"/>
+              </a:ext>
+            </a:extLst>
+          </p:cNvPr>
+          <p:cNvSpPr>
+            <a:spLocks noGrp="1"/>
+          </p:cNvSpPr>
+          <p:nvPr>
+            <p:ph type="ctrTitle"/>
+          </p:nvPr>
+        </p:nvSpPr>
+        <p:spPr>
+          <a:xfrm>
+            <a:off x="1524000" y="3016121"/>
+            <a:ext cx="9144000" cy="825757"/>
+          </a:xfrm>
+        </p:spPr>
+        <p:txBody>
+          <a:bodyPr>
+            <a:normAutofit/>
+          </a:bodyPr>
+          <a:lstStyle/>
+          <a:p>
+            <a:r>
+              <a:rPr lang="pt-BR" sz="4000" dirty="0">
+                <a:latin typeface="Arial" panose="020B0604020202020204" pitchFamily="34" charset="0"/>
+                <a:cs typeface="Arial" panose="020B0604020202020204" pitchFamily="34" charset="0"/>
+              </a:rPr>
+              <a:t>Obrigada</a:t>
+            </a:r>
+          </a:p>
+        </p:txBody>
+      </p:sp>
+      <p:sp>
+        <p:nvSpPr>
+          <p:cNvPr id="5" name="Retângulo 4">
+            <a:extLst>
+              <a:ext uri="{FF2B5EF4-FFF2-40B4-BE49-F238E27FC236}">
+                <a16:creationId xmlns:a16="http://schemas.microsoft.com/office/drawing/2014/main" id="{DA12847A-22F8-E641-C100-548299DEC00A}"/>
+              </a:ext>
+            </a:extLst>
+          </p:cNvPr>
+          <p:cNvSpPr/>
+          <p:nvPr/>
+        </p:nvSpPr>
+        <p:spPr>
+          <a:xfrm>
+            <a:off x="-143933" y="-737866"/>
+            <a:ext cx="12479866" cy="530056"/>
+          </a:xfrm>
+          <a:prstGeom prst="rect">
+            <a:avLst/>
+          </a:prstGeom>
+          <a:solidFill>
+            <a:schemeClr val="tx2">
+              <a:lumMod val="75000"/>
+              <a:lumOff val="25000"/>
+            </a:schemeClr>
+          </a:solidFill>
+          <a:ln>
+            <a:noFill/>
+          </a:ln>
+        </p:spPr>
+        <p:style>
+          <a:lnRef idx="2">
+            <a:schemeClr val="accent1">
+              <a:shade val="15000"/>
+            </a:schemeClr>
+          </a:lnRef>
+          <a:fillRef idx="1">
+            <a:schemeClr val="accent1"/>
+          </a:fillRef>
+          <a:effectRef idx="0">
+            <a:schemeClr val="accent1"/>
+          </a:effectRef>
+          <a:fontRef idx="minor">
+            <a:schemeClr val="lt1"/>
+          </a:fontRef>
+        </p:style>
+        <p:txBody>
+          <a:bodyPr rtlCol="0" anchor="ctr"/>
+          <a:lstStyle/>
+          <a:p>
+            <a:pPr algn="ctr"/>
+            <a:endParaRPr lang="pt-BR"/>
+          </a:p>
+        </p:txBody>
+      </p:sp>
+      <p:sp>
+        <p:nvSpPr>
+          <p:cNvPr id="9" name="Retângulo 8">
+            <a:extLst>
+              <a:ext uri="{FF2B5EF4-FFF2-40B4-BE49-F238E27FC236}">
+                <a16:creationId xmlns:a16="http://schemas.microsoft.com/office/drawing/2014/main" id="{C684D629-A785-598C-40B8-25FB1CC4DF67}"/>
+              </a:ext>
+            </a:extLst>
+          </p:cNvPr>
+          <p:cNvSpPr/>
+          <p:nvPr/>
+        </p:nvSpPr>
+        <p:spPr>
+          <a:xfrm>
+            <a:off x="12733867" y="5251125"/>
+            <a:ext cx="527117" cy="3674654"/>
+          </a:xfrm>
+          <a:prstGeom prst="rect">
+            <a:avLst/>
+          </a:prstGeom>
+          <a:solidFill>
+            <a:schemeClr val="tx2">
+              <a:lumMod val="75000"/>
+              <a:lumOff val="25000"/>
+            </a:schemeClr>
+          </a:solidFill>
+          <a:ln>
+            <a:noFill/>
+          </a:ln>
+        </p:spPr>
+        <p:style>
+          <a:lnRef idx="2">
+            <a:schemeClr val="accent1">
+              <a:shade val="15000"/>
+            </a:schemeClr>
+          </a:lnRef>
+          <a:fillRef idx="1">
+            <a:schemeClr val="accent1"/>
+          </a:fillRef>
+          <a:effectRef idx="0">
+            <a:schemeClr val="accent1"/>
+          </a:effectRef>
+          <a:fontRef idx="minor">
+            <a:schemeClr val="lt1"/>
+          </a:fontRef>
+        </p:style>
+        <p:txBody>
+          <a:bodyPr rtlCol="0" anchor="ctr"/>
+          <a:lstStyle/>
+          <a:p>
+            <a:pPr algn="ctr"/>
+            <a:endParaRPr lang="pt-BR"/>
+          </a:p>
+        </p:txBody>
+      </p:sp>
+      <p:pic>
+        <p:nvPicPr>
+          <p:cNvPr id="6" name="Imagem 5" descr="Desenho preto e branco&#10;&#10;Descrição gerada automaticamente com confiança média">
+            <a:extLst>
+              <a:ext uri="{FF2B5EF4-FFF2-40B4-BE49-F238E27FC236}">
+                <a16:creationId xmlns:a16="http://schemas.microsoft.com/office/drawing/2014/main" id="{B9B1CCA4-278E-49BD-2327-FC739DA9524C}"/>
+              </a:ext>
+            </a:extLst>
+          </p:cNvPr>
+          <p:cNvPicPr>
+            <a:picLocks noChangeAspect="1"/>
+          </p:cNvPicPr>
+          <p:nvPr/>
+        </p:nvPicPr>
+        <p:blipFill>
+          <a:blip r:embed="rId2">
+            <a:extLst>
+              <a:ext uri="{28A0092B-C50C-407E-A947-70E740481C1C}">
+                <a14:useLocalDpi xmlns:a14="http://schemas.microsoft.com/office/drawing/2010/main" val="0"/>
+              </a:ext>
+            </a:extLst>
+          </a:blip>
+          <a:stretch>
+            <a:fillRect/>
+          </a:stretch>
+        </p:blipFill>
+        <p:spPr>
+          <a:xfrm>
+            <a:off x="7628466" y="2616200"/>
+            <a:ext cx="6858000" cy="6858000"/>
+          </a:xfrm>
+          <a:prstGeom prst="rect">
+            <a:avLst/>
+          </a:prstGeom>
+        </p:spPr>
+      </p:pic>
+      <p:pic>
+        <p:nvPicPr>
+          <p:cNvPr id="7" name="Imagem 6" descr="Desenho preto e branco&#10;&#10;Descrição gerada automaticamente com confiança média">
+            <a:extLst>
+              <a:ext uri="{FF2B5EF4-FFF2-40B4-BE49-F238E27FC236}">
+                <a16:creationId xmlns:a16="http://schemas.microsoft.com/office/drawing/2014/main" id="{F5E06998-5B52-697C-D1E2-BEFD4A9266F1}"/>
+              </a:ext>
+            </a:extLst>
+          </p:cNvPr>
+          <p:cNvPicPr>
+            <a:picLocks noChangeAspect="1"/>
+          </p:cNvPicPr>
+          <p:nvPr/>
+        </p:nvPicPr>
+        <p:blipFill>
+          <a:blip r:embed="rId2">
+            <a:extLst>
+              <a:ext uri="{28A0092B-C50C-407E-A947-70E740481C1C}">
+                <a14:useLocalDpi xmlns:a14="http://schemas.microsoft.com/office/drawing/2010/main" val="0"/>
+              </a:ext>
+            </a:extLst>
+          </a:blip>
+          <a:stretch>
+            <a:fillRect/>
+          </a:stretch>
+        </p:blipFill>
+        <p:spPr>
+          <a:xfrm>
+            <a:off x="-2281767" y="-2441744"/>
+            <a:ext cx="6858000" cy="6858000"/>
+          </a:xfrm>
+          <a:prstGeom prst="rect">
+            <a:avLst/>
+          </a:prstGeom>
+        </p:spPr>
+      </p:pic>
+    </p:spTree>
+    <p:extLst>
+      <p:ext uri="{BB962C8B-B14F-4D97-AF65-F5344CB8AC3E}">
+        <p14:creationId xmlns:p14="http://schemas.microsoft.com/office/powerpoint/2010/main" val="2128270260"/>
       </p:ext>
     </p:extLst>
   </p:cSld>
@@ -8838,13 +9328,13 @@
   <p:clrMapOvr>
     <a:masterClrMapping/>
   </p:clrMapOvr>
-  <mc:AlternateContent xmlns:mc="http://schemas.openxmlformats.org/markup-compatibility/2006">
-    <mc:Choice xmlns:p159="http://schemas.microsoft.com/office/powerpoint/2015/09/main" Requires="p159">
+  <mc:AlternateContent xmlns:mc="http://schemas.openxmlformats.org/markup-compatibility/2006" xmlns:p159="http://schemas.microsoft.com/office/powerpoint/2015/09/main">
+    <mc:Choice Requires="p159">
       <p:transition xmlns:p14="http://schemas.microsoft.com/office/powerpoint/2010/main" spd="slow" p14:dur="2000">
         <p159:morph option="byObject"/>
       </p:transition>
     </mc:Choice>
-    <mc:Fallback>
+    <mc:Fallback xmlns="">
       <p:transition spd="slow">
         <p:fade/>
       </p:transition>
@@ -9177,13 +9667,13 @@
   <p:clrMapOvr>
     <a:masterClrMapping/>
   </p:clrMapOvr>
-  <mc:AlternateContent xmlns:mc="http://schemas.openxmlformats.org/markup-compatibility/2006">
-    <mc:Choice xmlns:p159="http://schemas.microsoft.com/office/powerpoint/2015/09/main" Requires="p159">
+  <mc:AlternateContent xmlns:mc="http://schemas.openxmlformats.org/markup-compatibility/2006" xmlns:p159="http://schemas.microsoft.com/office/powerpoint/2015/09/main">
+    <mc:Choice Requires="p159">
       <p:transition xmlns:p14="http://schemas.microsoft.com/office/powerpoint/2010/main" spd="slow" p14:dur="2000">
         <p159:morph option="byObject"/>
       </p:transition>
     </mc:Choice>
-    <mc:Fallback>
+    <mc:Fallback xmlns="">
       <p:transition spd="slow">
         <p:fade/>
       </p:transition>
@@ -9516,13 +10006,13 @@
   <p:clrMapOvr>
     <a:masterClrMapping/>
   </p:clrMapOvr>
-  <mc:AlternateContent xmlns:mc="http://schemas.openxmlformats.org/markup-compatibility/2006">
-    <mc:Choice xmlns:p159="http://schemas.microsoft.com/office/powerpoint/2015/09/main" Requires="p159">
+  <mc:AlternateContent xmlns:mc="http://schemas.openxmlformats.org/markup-compatibility/2006" xmlns:p159="http://schemas.microsoft.com/office/powerpoint/2015/09/main">
+    <mc:Choice Requires="p159">
       <p:transition xmlns:p14="http://schemas.microsoft.com/office/powerpoint/2010/main" spd="slow" p14:dur="2000">
         <p159:morph option="byObject"/>
       </p:transition>
     </mc:Choice>
-    <mc:Fallback>
+    <mc:Fallback xmlns="">
       <p:transition spd="slow">
         <p:fade/>
       </p:transition>
@@ -9846,13 +10336,13 @@
   <p:clrMapOvr>
     <a:masterClrMapping/>
   </p:clrMapOvr>
-  <mc:AlternateContent xmlns:mc="http://schemas.openxmlformats.org/markup-compatibility/2006">
-    <mc:Choice xmlns:p159="http://schemas.microsoft.com/office/powerpoint/2015/09/main" Requires="p159">
+  <mc:AlternateContent xmlns:mc="http://schemas.openxmlformats.org/markup-compatibility/2006" xmlns:p159="http://schemas.microsoft.com/office/powerpoint/2015/09/main">
+    <mc:Choice Requires="p159">
       <p:transition xmlns:p14="http://schemas.microsoft.com/office/powerpoint/2010/main" spd="slow" p14:dur="2000">
         <p159:morph option="byObject"/>
       </p:transition>
     </mc:Choice>
-    <mc:Fallback>
+    <mc:Fallback xmlns="">
       <p:transition spd="slow">
         <p:fade/>
       </p:transition>
@@ -10219,13 +10709,13 @@
   <p:clrMapOvr>
     <a:masterClrMapping/>
   </p:clrMapOvr>
-  <mc:AlternateContent xmlns:mc="http://schemas.openxmlformats.org/markup-compatibility/2006">
-    <mc:Choice xmlns:p159="http://schemas.microsoft.com/office/powerpoint/2015/09/main" Requires="p159">
+  <mc:AlternateContent xmlns:mc="http://schemas.openxmlformats.org/markup-compatibility/2006" xmlns:p159="http://schemas.microsoft.com/office/powerpoint/2015/09/main">
+    <mc:Choice Requires="p159">
       <p:transition xmlns:p14="http://schemas.microsoft.com/office/powerpoint/2010/main" spd="slow" p14:dur="2000">
         <p159:morph option="byObject"/>
       </p:transition>
     </mc:Choice>
-    <mc:Fallback>
+    <mc:Fallback xmlns="">
       <p:transition spd="slow">
         <p:fade/>
       </p:transition>

</xml_diff>